<commit_message>
Final Handin Dokumente erweitert und Final Presentation erweitertet, aber noch nicht fertig.
</commit_message>
<xml_diff>
--- a/Final Project Handin/Final Presentation/Online-Library.pptx
+++ b/Final Project Handin/Final Presentation/Online-Library.pptx
@@ -7,14 +7,30 @@
   <p:sldIdLst>
     <p:sldId id="256" r:id="rId2"/>
     <p:sldId id="258" r:id="rId3"/>
-    <p:sldId id="259" r:id="rId4"/>
-    <p:sldId id="260" r:id="rId5"/>
-    <p:sldId id="261" r:id="rId6"/>
+    <p:sldId id="266" r:id="rId4"/>
+    <p:sldId id="265" r:id="rId5"/>
+    <p:sldId id="264" r:id="rId6"/>
+    <p:sldId id="259" r:id="rId7"/>
+    <p:sldId id="260" r:id="rId8"/>
+    <p:sldId id="261" r:id="rId9"/>
+    <p:sldId id="262" r:id="rId10"/>
+    <p:sldId id="263" r:id="rId11"/>
+    <p:sldId id="267" r:id="rId12"/>
+    <p:sldId id="277" r:id="rId13"/>
+    <p:sldId id="269" r:id="rId14"/>
+    <p:sldId id="270" r:id="rId15"/>
+    <p:sldId id="268" r:id="rId16"/>
+    <p:sldId id="271" r:id="rId17"/>
+    <p:sldId id="276" r:id="rId18"/>
+    <p:sldId id="272" r:id="rId19"/>
+    <p:sldId id="274" r:id="rId20"/>
+    <p:sldId id="273" r:id="rId21"/>
+    <p:sldId id="275" r:id="rId22"/>
   </p:sldIdLst>
   <p:sldSz cx="9144000" cy="6858000" type="screen4x3"/>
   <p:notesSz cx="6858000" cy="9144000"/>
   <p:custDataLst>
-    <p:tags r:id="rId7"/>
+    <p:tags r:id="rId23"/>
   </p:custDataLst>
   <p:defaultTextStyle>
     <a:defPPr>
@@ -225,7 +241,7 @@
           <a:p>
             <a:fld id="{C542B042-146A-4BF0-A56A-76E3CE54648B}" type="datetimeFigureOut">
               <a:rPr lang="de-DE" smtClean="0"/>
-              <a:t>05.06.2014</a:t>
+              <a:t>10.06.2014</a:t>
             </a:fld>
             <a:endParaRPr lang="de-DE"/>
           </a:p>
@@ -451,7 +467,7 @@
           <a:p>
             <a:fld id="{C542B042-146A-4BF0-A56A-76E3CE54648B}" type="datetimeFigureOut">
               <a:rPr lang="de-DE" smtClean="0"/>
-              <a:t>05.06.2014</a:t>
+              <a:t>10.06.2014</a:t>
             </a:fld>
             <a:endParaRPr lang="de-DE"/>
           </a:p>
@@ -626,7 +642,7 @@
           <a:p>
             <a:fld id="{C542B042-146A-4BF0-A56A-76E3CE54648B}" type="datetimeFigureOut">
               <a:rPr lang="de-DE" smtClean="0"/>
-              <a:t>05.06.2014</a:t>
+              <a:t>10.06.2014</a:t>
             </a:fld>
             <a:endParaRPr lang="de-DE"/>
           </a:p>
@@ -791,7 +807,7 @@
           <a:p>
             <a:fld id="{C542B042-146A-4BF0-A56A-76E3CE54648B}" type="datetimeFigureOut">
               <a:rPr lang="de-DE" smtClean="0"/>
-              <a:t>05.06.2014</a:t>
+              <a:t>10.06.2014</a:t>
             </a:fld>
             <a:endParaRPr lang="de-DE"/>
           </a:p>
@@ -1035,7 +1051,7 @@
           <a:p>
             <a:fld id="{C542B042-146A-4BF0-A56A-76E3CE54648B}" type="datetimeFigureOut">
               <a:rPr lang="de-DE" smtClean="0"/>
-              <a:t>05.06.2014</a:t>
+              <a:t>10.06.2014</a:t>
             </a:fld>
             <a:endParaRPr lang="de-DE"/>
           </a:p>
@@ -1299,7 +1315,7 @@
           <a:p>
             <a:fld id="{C542B042-146A-4BF0-A56A-76E3CE54648B}" type="datetimeFigureOut">
               <a:rPr lang="de-DE" smtClean="0"/>
-              <a:t>05.06.2014</a:t>
+              <a:t>10.06.2014</a:t>
             </a:fld>
             <a:endParaRPr lang="de-DE"/>
           </a:p>
@@ -1673,7 +1689,7 @@
           <a:p>
             <a:fld id="{C542B042-146A-4BF0-A56A-76E3CE54648B}" type="datetimeFigureOut">
               <a:rPr lang="de-DE" smtClean="0"/>
-              <a:t>05.06.2014</a:t>
+              <a:t>10.06.2014</a:t>
             </a:fld>
             <a:endParaRPr lang="de-DE"/>
           </a:p>
@@ -1786,7 +1802,7 @@
           <a:p>
             <a:fld id="{C542B042-146A-4BF0-A56A-76E3CE54648B}" type="datetimeFigureOut">
               <a:rPr lang="de-DE" smtClean="0"/>
-              <a:t>05.06.2014</a:t>
+              <a:t>10.06.2014</a:t>
             </a:fld>
             <a:endParaRPr lang="de-DE"/>
           </a:p>
@@ -1876,7 +1892,7 @@
           <a:p>
             <a:fld id="{C542B042-146A-4BF0-A56A-76E3CE54648B}" type="datetimeFigureOut">
               <a:rPr lang="de-DE" smtClean="0"/>
-              <a:t>05.06.2014</a:t>
+              <a:t>10.06.2014</a:t>
             </a:fld>
             <a:endParaRPr lang="de-DE"/>
           </a:p>
@@ -2134,7 +2150,7 @@
           <a:p>
             <a:fld id="{C542B042-146A-4BF0-A56A-76E3CE54648B}" type="datetimeFigureOut">
               <a:rPr lang="de-DE" smtClean="0"/>
-              <a:t>05.06.2014</a:t>
+              <a:t>10.06.2014</a:t>
             </a:fld>
             <a:endParaRPr lang="de-DE"/>
           </a:p>
@@ -2398,7 +2414,7 @@
           <a:p>
             <a:fld id="{C542B042-146A-4BF0-A56A-76E3CE54648B}" type="datetimeFigureOut">
               <a:rPr lang="de-DE" smtClean="0"/>
-              <a:t>05.06.2014</a:t>
+              <a:t>10.06.2014</a:t>
             </a:fld>
             <a:endParaRPr lang="de-DE"/>
           </a:p>
@@ -2615,7 +2631,7 @@
           <a:p>
             <a:fld id="{C542B042-146A-4BF0-A56A-76E3CE54648B}" type="datetimeFigureOut">
               <a:rPr lang="de-DE" smtClean="0"/>
-              <a:t>05.06.2014</a:t>
+              <a:t>10.06.2014</a:t>
             </a:fld>
             <a:endParaRPr lang="de-DE"/>
           </a:p>
@@ -3111,6 +3127,1055 @@
 </p:sld>
 </file>
 
+<file path=ppt/slides/slide10.xml><?xml version="1.0" encoding="utf-8"?>
+<p:sld xmlns:a="http://schemas.openxmlformats.org/drawingml/2006/main" xmlns:r="http://schemas.openxmlformats.org/officeDocument/2006/relationships" xmlns:p="http://schemas.openxmlformats.org/presentationml/2006/main">
+  <p:cSld>
+    <p:spTree>
+      <p:nvGrpSpPr>
+        <p:cNvPr id="1" name=""/>
+        <p:cNvGrpSpPr/>
+        <p:nvPr/>
+      </p:nvGrpSpPr>
+      <p:grpSpPr>
+        <a:xfrm>
+          <a:off x="0" y="0"/>
+          <a:ext cx="0" cy="0"/>
+          <a:chOff x="0" y="0"/>
+          <a:chExt cx="0" cy="0"/>
+        </a:xfrm>
+      </p:grpSpPr>
+      <p:sp>
+        <p:nvSpPr>
+          <p:cNvPr id="2" name="Titel 1"/>
+          <p:cNvSpPr>
+            <a:spLocks noGrp="1"/>
+          </p:cNvSpPr>
+          <p:nvPr>
+            <p:ph type="title"/>
+          </p:nvPr>
+        </p:nvSpPr>
+        <p:spPr/>
+        <p:txBody>
+          <a:bodyPr/>
+          <a:lstStyle/>
+          <a:p>
+            <a:r>
+              <a:rPr lang="de-DE" dirty="0" err="1" smtClean="0"/>
+              <a:t>Use</a:t>
+            </a:r>
+            <a:r>
+              <a:rPr lang="de-DE" dirty="0" smtClean="0"/>
+              <a:t>-Case: Daten bearbeiten</a:t>
+            </a:r>
+            <a:endParaRPr lang="de-DE" dirty="0"/>
+          </a:p>
+        </p:txBody>
+      </p:sp>
+      <p:pic>
+        <p:nvPicPr>
+          <p:cNvPr id="4" name="Inhaltsplatzhalter 3"/>
+          <p:cNvPicPr>
+            <a:picLocks noGrp="1" noChangeAspect="1"/>
+          </p:cNvPicPr>
+          <p:nvPr>
+            <p:ph idx="1"/>
+          </p:nvPr>
+        </p:nvPicPr>
+        <p:blipFill>
+          <a:blip r:embed="rId2">
+            <a:extLst>
+              <a:ext uri="{28A0092B-C50C-407E-A947-70E740481C1C}">
+                <a14:useLocalDpi xmlns:a14="http://schemas.microsoft.com/office/drawing/2010/main" val="0"/>
+              </a:ext>
+            </a:extLst>
+          </a:blip>
+          <a:stretch>
+            <a:fillRect/>
+          </a:stretch>
+        </p:blipFill>
+        <p:spPr>
+          <a:xfrm>
+            <a:off x="2805583" y="1600200"/>
+            <a:ext cx="3532834" cy="4708525"/>
+          </a:xfrm>
+        </p:spPr>
+      </p:pic>
+    </p:spTree>
+    <p:extLst>
+      <p:ext uri="{BB962C8B-B14F-4D97-AF65-F5344CB8AC3E}">
+        <p14:creationId xmlns:p14="http://schemas.microsoft.com/office/powerpoint/2010/main" val="2115051225"/>
+      </p:ext>
+    </p:extLst>
+  </p:cSld>
+  <p:clrMapOvr>
+    <a:masterClrMapping/>
+  </p:clrMapOvr>
+  <p:timing>
+    <p:tnLst>
+      <p:par>
+        <p:cTn id="1" dur="indefinite" restart="never" nodeType="tmRoot"/>
+      </p:par>
+    </p:tnLst>
+  </p:timing>
+</p:sld>
+</file>
+
+<file path=ppt/slides/slide11.xml><?xml version="1.0" encoding="utf-8"?>
+<p:sld xmlns:a="http://schemas.openxmlformats.org/drawingml/2006/main" xmlns:r="http://schemas.openxmlformats.org/officeDocument/2006/relationships" xmlns:p="http://schemas.openxmlformats.org/presentationml/2006/main">
+  <p:cSld>
+    <p:spTree>
+      <p:nvGrpSpPr>
+        <p:cNvPr id="1" name=""/>
+        <p:cNvGrpSpPr/>
+        <p:nvPr/>
+      </p:nvGrpSpPr>
+      <p:grpSpPr>
+        <a:xfrm>
+          <a:off x="0" y="0"/>
+          <a:ext cx="0" cy="0"/>
+          <a:chOff x="0" y="0"/>
+          <a:chExt cx="0" cy="0"/>
+        </a:xfrm>
+      </p:grpSpPr>
+      <p:sp>
+        <p:nvSpPr>
+          <p:cNvPr id="2" name="Titel 1"/>
+          <p:cNvSpPr>
+            <a:spLocks noGrp="1"/>
+          </p:cNvSpPr>
+          <p:nvPr>
+            <p:ph type="title"/>
+          </p:nvPr>
+        </p:nvSpPr>
+        <p:spPr/>
+        <p:txBody>
+          <a:bodyPr/>
+          <a:lstStyle/>
+          <a:p>
+            <a:r>
+              <a:rPr lang="de-DE" dirty="0" smtClean="0"/>
+              <a:t>Project Management</a:t>
+            </a:r>
+            <a:endParaRPr lang="de-DE" dirty="0"/>
+          </a:p>
+        </p:txBody>
+      </p:sp>
+      <p:pic>
+        <p:nvPicPr>
+          <p:cNvPr id="4" name="Inhaltsplatzhalter 3"/>
+          <p:cNvPicPr>
+            <a:picLocks noGrp="1" noChangeAspect="1"/>
+          </p:cNvPicPr>
+          <p:nvPr>
+            <p:ph idx="1"/>
+          </p:nvPr>
+        </p:nvPicPr>
+        <p:blipFill>
+          <a:blip r:embed="rId2">
+            <a:extLst>
+              <a:ext uri="{28A0092B-C50C-407E-A947-70E740481C1C}">
+                <a14:useLocalDpi xmlns:a14="http://schemas.microsoft.com/office/drawing/2010/main" val="0"/>
+              </a:ext>
+            </a:extLst>
+          </a:blip>
+          <a:stretch>
+            <a:fillRect/>
+          </a:stretch>
+        </p:blipFill>
+        <p:spPr>
+          <a:xfrm>
+            <a:off x="466553" y="1600200"/>
+            <a:ext cx="8210893" cy="4708525"/>
+          </a:xfrm>
+        </p:spPr>
+      </p:pic>
+    </p:spTree>
+    <p:extLst>
+      <p:ext uri="{BB962C8B-B14F-4D97-AF65-F5344CB8AC3E}">
+        <p14:creationId xmlns:p14="http://schemas.microsoft.com/office/powerpoint/2010/main" val="2203459053"/>
+      </p:ext>
+    </p:extLst>
+  </p:cSld>
+  <p:clrMapOvr>
+    <a:masterClrMapping/>
+  </p:clrMapOvr>
+  <p:timing>
+    <p:tnLst>
+      <p:par>
+        <p:cTn id="1" dur="indefinite" restart="never" nodeType="tmRoot"/>
+      </p:par>
+    </p:tnLst>
+  </p:timing>
+</p:sld>
+</file>
+
+<file path=ppt/slides/slide12.xml><?xml version="1.0" encoding="utf-8"?>
+<p:sld xmlns:a="http://schemas.openxmlformats.org/drawingml/2006/main" xmlns:r="http://schemas.openxmlformats.org/officeDocument/2006/relationships" xmlns:p="http://schemas.openxmlformats.org/presentationml/2006/main">
+  <p:cSld>
+    <p:spTree>
+      <p:nvGrpSpPr>
+        <p:cNvPr id="1" name=""/>
+        <p:cNvGrpSpPr/>
+        <p:nvPr/>
+      </p:nvGrpSpPr>
+      <p:grpSpPr>
+        <a:xfrm>
+          <a:off x="0" y="0"/>
+          <a:ext cx="0" cy="0"/>
+          <a:chOff x="0" y="0"/>
+          <a:chExt cx="0" cy="0"/>
+        </a:xfrm>
+      </p:grpSpPr>
+      <p:sp>
+        <p:nvSpPr>
+          <p:cNvPr id="2" name="Titel 1"/>
+          <p:cNvSpPr>
+            <a:spLocks noGrp="1"/>
+          </p:cNvSpPr>
+          <p:nvPr>
+            <p:ph type="title"/>
+          </p:nvPr>
+        </p:nvSpPr>
+        <p:spPr/>
+        <p:txBody>
+          <a:bodyPr/>
+          <a:lstStyle/>
+          <a:p>
+            <a:r>
+              <a:rPr lang="de-DE" dirty="0" smtClean="0"/>
+              <a:t>Project</a:t>
+            </a:r>
+            <a:endParaRPr lang="de-DE" dirty="0"/>
+          </a:p>
+        </p:txBody>
+      </p:sp>
+      <p:sp>
+        <p:nvSpPr>
+          <p:cNvPr id="3" name="Inhaltsplatzhalter 2"/>
+          <p:cNvSpPr>
+            <a:spLocks noGrp="1"/>
+          </p:cNvSpPr>
+          <p:nvPr>
+            <p:ph idx="1"/>
+          </p:nvPr>
+        </p:nvSpPr>
+        <p:spPr/>
+        <p:txBody>
+          <a:bodyPr/>
+          <a:lstStyle/>
+          <a:p>
+            <a:r>
+              <a:rPr lang="en-US" dirty="0"/>
+              <a:t>Project </a:t>
+            </a:r>
+            <a:r>
+              <a:rPr lang="en-US" dirty="0" err="1"/>
+              <a:t>managmeent</a:t>
+            </a:r>
+            <a:endParaRPr lang="en-US" dirty="0"/>
+          </a:p>
+          <a:p>
+            <a:r>
+              <a:rPr lang="en-US" dirty="0" err="1"/>
+              <a:t>MSProject</a:t>
+            </a:r>
+            <a:endParaRPr lang="en-US" dirty="0"/>
+          </a:p>
+          <a:p>
+            <a:r>
+              <a:rPr lang="en-US" dirty="0"/>
+              <a:t>Sprint</a:t>
+            </a:r>
+          </a:p>
+          <a:p>
+            <a:r>
+              <a:rPr lang="en-US" dirty="0"/>
+              <a:t>Iterative Process</a:t>
+            </a:r>
+          </a:p>
+          <a:p>
+            <a:r>
+              <a:rPr lang="en-US" dirty="0"/>
+              <a:t>RUP</a:t>
+            </a:r>
+          </a:p>
+          <a:p>
+            <a:r>
+              <a:rPr lang="en-US" dirty="0"/>
+              <a:t>Explains what they are and why use them</a:t>
+            </a:r>
+          </a:p>
+          <a:p>
+            <a:r>
+              <a:rPr lang="en-US" dirty="0"/>
+              <a:t>FP project estimation</a:t>
+            </a:r>
+          </a:p>
+          <a:p>
+            <a:endParaRPr lang="de-DE" dirty="0"/>
+          </a:p>
+        </p:txBody>
+      </p:sp>
+    </p:spTree>
+    <p:extLst>
+      <p:ext uri="{BB962C8B-B14F-4D97-AF65-F5344CB8AC3E}">
+        <p14:creationId xmlns:p14="http://schemas.microsoft.com/office/powerpoint/2010/main" val="2637721913"/>
+      </p:ext>
+    </p:extLst>
+  </p:cSld>
+  <p:clrMapOvr>
+    <a:masterClrMapping/>
+  </p:clrMapOvr>
+  <p:timing>
+    <p:tnLst>
+      <p:par>
+        <p:cTn id="1" dur="indefinite" restart="never" nodeType="tmRoot"/>
+      </p:par>
+    </p:tnLst>
+  </p:timing>
+</p:sld>
+</file>
+
+<file path=ppt/slides/slide13.xml><?xml version="1.0" encoding="utf-8"?>
+<p:sld xmlns:a="http://schemas.openxmlformats.org/drawingml/2006/main" xmlns:r="http://schemas.openxmlformats.org/officeDocument/2006/relationships" xmlns:p="http://schemas.openxmlformats.org/presentationml/2006/main">
+  <p:cSld>
+    <p:spTree>
+      <p:nvGrpSpPr>
+        <p:cNvPr id="1" name=""/>
+        <p:cNvGrpSpPr/>
+        <p:nvPr/>
+      </p:nvGrpSpPr>
+      <p:grpSpPr>
+        <a:xfrm>
+          <a:off x="0" y="0"/>
+          <a:ext cx="0" cy="0"/>
+          <a:chOff x="0" y="0"/>
+          <a:chExt cx="0" cy="0"/>
+        </a:xfrm>
+      </p:grpSpPr>
+      <p:sp>
+        <p:nvSpPr>
+          <p:cNvPr id="2" name="Titel 1"/>
+          <p:cNvSpPr>
+            <a:spLocks noGrp="1"/>
+          </p:cNvSpPr>
+          <p:nvPr>
+            <p:ph type="title"/>
+          </p:nvPr>
+        </p:nvSpPr>
+        <p:spPr/>
+        <p:txBody>
+          <a:bodyPr/>
+          <a:lstStyle/>
+          <a:p>
+            <a:r>
+              <a:rPr lang="de-DE" dirty="0" smtClean="0"/>
+              <a:t>FP </a:t>
+            </a:r>
+            <a:r>
+              <a:rPr lang="de-DE" dirty="0" err="1" smtClean="0"/>
+              <a:t>Estimation</a:t>
+            </a:r>
+            <a:endParaRPr lang="de-DE" dirty="0"/>
+          </a:p>
+        </p:txBody>
+      </p:sp>
+      <p:sp>
+        <p:nvSpPr>
+          <p:cNvPr id="3" name="Inhaltsplatzhalter 2"/>
+          <p:cNvSpPr>
+            <a:spLocks noGrp="1"/>
+          </p:cNvSpPr>
+          <p:nvPr>
+            <p:ph idx="1"/>
+          </p:nvPr>
+        </p:nvSpPr>
+        <p:spPr/>
+        <p:txBody>
+          <a:bodyPr/>
+          <a:lstStyle/>
+          <a:p>
+            <a:endParaRPr lang="de-DE"/>
+          </a:p>
+        </p:txBody>
+      </p:sp>
+    </p:spTree>
+    <p:extLst>
+      <p:ext uri="{BB962C8B-B14F-4D97-AF65-F5344CB8AC3E}">
+        <p14:creationId xmlns:p14="http://schemas.microsoft.com/office/powerpoint/2010/main" val="3262423439"/>
+      </p:ext>
+    </p:extLst>
+  </p:cSld>
+  <p:clrMapOvr>
+    <a:masterClrMapping/>
+  </p:clrMapOvr>
+  <p:timing>
+    <p:tnLst>
+      <p:par>
+        <p:cTn id="1" dur="indefinite" restart="never" nodeType="tmRoot"/>
+      </p:par>
+    </p:tnLst>
+  </p:timing>
+</p:sld>
+</file>
+
+<file path=ppt/slides/slide14.xml><?xml version="1.0" encoding="utf-8"?>
+<p:sld xmlns:a="http://schemas.openxmlformats.org/drawingml/2006/main" xmlns:r="http://schemas.openxmlformats.org/officeDocument/2006/relationships" xmlns:p="http://schemas.openxmlformats.org/presentationml/2006/main">
+  <p:cSld>
+    <p:spTree>
+      <p:nvGrpSpPr>
+        <p:cNvPr id="1" name=""/>
+        <p:cNvGrpSpPr/>
+        <p:nvPr/>
+      </p:nvGrpSpPr>
+      <p:grpSpPr>
+        <a:xfrm>
+          <a:off x="0" y="0"/>
+          <a:ext cx="0" cy="0"/>
+          <a:chOff x="0" y="0"/>
+          <a:chExt cx="0" cy="0"/>
+        </a:xfrm>
+      </p:grpSpPr>
+      <p:sp>
+        <p:nvSpPr>
+          <p:cNvPr id="2" name="Titel 1"/>
+          <p:cNvSpPr>
+            <a:spLocks noGrp="1"/>
+          </p:cNvSpPr>
+          <p:nvPr>
+            <p:ph type="title"/>
+          </p:nvPr>
+        </p:nvSpPr>
+        <p:spPr/>
+        <p:txBody>
+          <a:bodyPr/>
+          <a:lstStyle/>
+          <a:p>
+            <a:r>
+              <a:rPr lang="de-DE" dirty="0" smtClean="0"/>
+              <a:t>Demo</a:t>
+            </a:r>
+            <a:endParaRPr lang="de-DE" dirty="0"/>
+          </a:p>
+        </p:txBody>
+      </p:sp>
+      <p:sp>
+        <p:nvSpPr>
+          <p:cNvPr id="3" name="Inhaltsplatzhalter 2"/>
+          <p:cNvSpPr>
+            <a:spLocks noGrp="1"/>
+          </p:cNvSpPr>
+          <p:nvPr>
+            <p:ph idx="1"/>
+          </p:nvPr>
+        </p:nvSpPr>
+        <p:spPr/>
+        <p:txBody>
+          <a:bodyPr/>
+          <a:lstStyle/>
+          <a:p>
+            <a:r>
+              <a:rPr lang="de-DE" dirty="0" smtClean="0"/>
+              <a:t>Link: </a:t>
+            </a:r>
+            <a:r>
+              <a:rPr lang="de-DE" dirty="0">
+                <a:hlinkClick r:id="rId2"/>
+              </a:rPr>
+              <a:t>http://torsten-werner.com/OnLibDev/</a:t>
+            </a:r>
+            <a:endParaRPr lang="de-DE" dirty="0"/>
+          </a:p>
+        </p:txBody>
+      </p:sp>
+    </p:spTree>
+    <p:extLst>
+      <p:ext uri="{BB962C8B-B14F-4D97-AF65-F5344CB8AC3E}">
+        <p14:creationId xmlns:p14="http://schemas.microsoft.com/office/powerpoint/2010/main" val="1328486154"/>
+      </p:ext>
+    </p:extLst>
+  </p:cSld>
+  <p:clrMapOvr>
+    <a:masterClrMapping/>
+  </p:clrMapOvr>
+  <p:timing>
+    <p:tnLst>
+      <p:par>
+        <p:cTn id="1" dur="indefinite" restart="never" nodeType="tmRoot"/>
+      </p:par>
+    </p:tnLst>
+  </p:timing>
+</p:sld>
+</file>
+
+<file path=ppt/slides/slide15.xml><?xml version="1.0" encoding="utf-8"?>
+<p:sld xmlns:a="http://schemas.openxmlformats.org/drawingml/2006/main" xmlns:r="http://schemas.openxmlformats.org/officeDocument/2006/relationships" xmlns:p="http://schemas.openxmlformats.org/presentationml/2006/main">
+  <p:cSld>
+    <p:spTree>
+      <p:nvGrpSpPr>
+        <p:cNvPr id="1" name=""/>
+        <p:cNvGrpSpPr/>
+        <p:nvPr/>
+      </p:nvGrpSpPr>
+      <p:grpSpPr>
+        <a:xfrm>
+          <a:off x="0" y="0"/>
+          <a:ext cx="0" cy="0"/>
+          <a:chOff x="0" y="0"/>
+          <a:chExt cx="0" cy="0"/>
+        </a:xfrm>
+      </p:grpSpPr>
+      <p:sp>
+        <p:nvSpPr>
+          <p:cNvPr id="2" name="Titel 1"/>
+          <p:cNvSpPr>
+            <a:spLocks noGrp="1"/>
+          </p:cNvSpPr>
+          <p:nvPr>
+            <p:ph type="title"/>
+          </p:nvPr>
+        </p:nvSpPr>
+        <p:spPr/>
+        <p:txBody>
+          <a:bodyPr/>
+          <a:lstStyle/>
+          <a:p>
+            <a:r>
+              <a:rPr lang="de-DE" dirty="0" err="1" smtClean="0"/>
+              <a:t>Extend</a:t>
+            </a:r>
+            <a:r>
+              <a:rPr lang="de-DE" dirty="0" smtClean="0"/>
+              <a:t> </a:t>
+            </a:r>
+            <a:r>
+              <a:rPr lang="de-DE" dirty="0" err="1" smtClean="0"/>
+              <a:t>of</a:t>
+            </a:r>
+            <a:r>
+              <a:rPr lang="de-DE" dirty="0" smtClean="0"/>
+              <a:t> </a:t>
+            </a:r>
+            <a:r>
+              <a:rPr lang="de-DE" dirty="0" err="1" smtClean="0"/>
+              <a:t>funtionality</a:t>
+            </a:r>
+            <a:endParaRPr lang="de-DE" dirty="0"/>
+          </a:p>
+        </p:txBody>
+      </p:sp>
+      <p:sp>
+        <p:nvSpPr>
+          <p:cNvPr id="3" name="Inhaltsplatzhalter 2"/>
+          <p:cNvSpPr>
+            <a:spLocks noGrp="1"/>
+          </p:cNvSpPr>
+          <p:nvPr>
+            <p:ph idx="1"/>
+          </p:nvPr>
+        </p:nvSpPr>
+        <p:spPr/>
+        <p:txBody>
+          <a:bodyPr/>
+          <a:lstStyle/>
+          <a:p>
+            <a:r>
+              <a:rPr lang="de-DE" dirty="0" smtClean="0"/>
+              <a:t>5 </a:t>
+            </a:r>
+            <a:r>
+              <a:rPr lang="de-DE" dirty="0" err="1" smtClean="0"/>
+              <a:t>Use</a:t>
+            </a:r>
+            <a:r>
+              <a:rPr lang="de-DE" dirty="0" smtClean="0"/>
+              <a:t> Cases</a:t>
+            </a:r>
+            <a:endParaRPr lang="de-DE" dirty="0"/>
+          </a:p>
+        </p:txBody>
+      </p:sp>
+    </p:spTree>
+    <p:extLst>
+      <p:ext uri="{BB962C8B-B14F-4D97-AF65-F5344CB8AC3E}">
+        <p14:creationId xmlns:p14="http://schemas.microsoft.com/office/powerpoint/2010/main" val="3206884456"/>
+      </p:ext>
+    </p:extLst>
+  </p:cSld>
+  <p:clrMapOvr>
+    <a:masterClrMapping/>
+  </p:clrMapOvr>
+  <p:timing>
+    <p:tnLst>
+      <p:par>
+        <p:cTn id="1" dur="indefinite" restart="never" nodeType="tmRoot"/>
+      </p:par>
+    </p:tnLst>
+  </p:timing>
+</p:sld>
+</file>
+
+<file path=ppt/slides/slide16.xml><?xml version="1.0" encoding="utf-8"?>
+<p:sld xmlns:a="http://schemas.openxmlformats.org/drawingml/2006/main" xmlns:r="http://schemas.openxmlformats.org/officeDocument/2006/relationships" xmlns:p="http://schemas.openxmlformats.org/presentationml/2006/main">
+  <p:cSld>
+    <p:spTree>
+      <p:nvGrpSpPr>
+        <p:cNvPr id="1" name=""/>
+        <p:cNvGrpSpPr/>
+        <p:nvPr/>
+      </p:nvGrpSpPr>
+      <p:grpSpPr>
+        <a:xfrm>
+          <a:off x="0" y="0"/>
+          <a:ext cx="0" cy="0"/>
+          <a:chOff x="0" y="0"/>
+          <a:chExt cx="0" cy="0"/>
+        </a:xfrm>
+      </p:grpSpPr>
+      <p:sp>
+        <p:nvSpPr>
+          <p:cNvPr id="2" name="Titel 1"/>
+          <p:cNvSpPr>
+            <a:spLocks noGrp="1"/>
+          </p:cNvSpPr>
+          <p:nvPr>
+            <p:ph type="title"/>
+          </p:nvPr>
+        </p:nvSpPr>
+        <p:spPr/>
+        <p:txBody>
+          <a:bodyPr/>
+          <a:lstStyle/>
+          <a:p>
+            <a:r>
+              <a:rPr lang="de-DE" dirty="0" smtClean="0"/>
+              <a:t>Qualität</a:t>
+            </a:r>
+            <a:endParaRPr lang="de-DE" dirty="0"/>
+          </a:p>
+        </p:txBody>
+      </p:sp>
+      <p:sp>
+        <p:nvSpPr>
+          <p:cNvPr id="3" name="Inhaltsplatzhalter 2"/>
+          <p:cNvSpPr>
+            <a:spLocks noGrp="1"/>
+          </p:cNvSpPr>
+          <p:nvPr>
+            <p:ph idx="1"/>
+          </p:nvPr>
+        </p:nvSpPr>
+        <p:spPr/>
+        <p:txBody>
+          <a:bodyPr/>
+          <a:lstStyle/>
+          <a:p>
+            <a:r>
+              <a:rPr lang="de-DE" dirty="0" err="1"/>
+              <a:t>Configuration</a:t>
+            </a:r>
+            <a:r>
+              <a:rPr lang="de-DE" dirty="0"/>
+              <a:t> Management</a:t>
+            </a:r>
+          </a:p>
+          <a:p>
+            <a:pPr lvl="1"/>
+            <a:r>
+              <a:rPr lang="de-DE" dirty="0" err="1"/>
+              <a:t>Git</a:t>
+            </a:r>
+            <a:r>
+              <a:rPr lang="de-DE" dirty="0"/>
+              <a:t> zur Versionsverwaltung des Codes</a:t>
+            </a:r>
+          </a:p>
+          <a:p>
+            <a:pPr lvl="1"/>
+            <a:r>
+              <a:rPr lang="de-DE" dirty="0"/>
+              <a:t>SVN zur Verwaltung von Dokumenten</a:t>
+            </a:r>
+          </a:p>
+          <a:p>
+            <a:pPr lvl="1"/>
+            <a:r>
+              <a:rPr lang="de-DE" dirty="0"/>
+              <a:t>Visual Studio</a:t>
+            </a:r>
+          </a:p>
+          <a:p>
+            <a:pPr lvl="1"/>
+            <a:r>
+              <a:rPr lang="de-DE" dirty="0"/>
+              <a:t>Microsoft Web </a:t>
+            </a:r>
+            <a:r>
+              <a:rPr lang="de-DE" dirty="0" err="1"/>
+              <a:t>Deploy</a:t>
+            </a:r>
+            <a:endParaRPr lang="de-DE" dirty="0"/>
+          </a:p>
+          <a:p>
+            <a:pPr lvl="1"/>
+            <a:r>
+              <a:rPr lang="de-DE" dirty="0"/>
+              <a:t>ASP.NET MVC</a:t>
+            </a:r>
+          </a:p>
+          <a:p>
+            <a:pPr lvl="2"/>
+            <a:r>
+              <a:rPr lang="de-DE" dirty="0"/>
+              <a:t>Codegenerator</a:t>
+            </a:r>
+          </a:p>
+          <a:p>
+            <a:pPr lvl="2"/>
+            <a:r>
+              <a:rPr lang="de-DE" dirty="0" err="1"/>
+              <a:t>Scaffolding</a:t>
+            </a:r>
+            <a:endParaRPr lang="de-DE" dirty="0"/>
+          </a:p>
+          <a:p>
+            <a:pPr lvl="2"/>
+            <a:r>
+              <a:rPr lang="de-DE" dirty="0"/>
+              <a:t>MVC Konzept</a:t>
+            </a:r>
+          </a:p>
+          <a:p>
+            <a:pPr lvl="1"/>
+            <a:r>
+              <a:rPr lang="de-DE" dirty="0"/>
+              <a:t>DB-Server: MS-SQL</a:t>
+            </a:r>
+          </a:p>
+          <a:p>
+            <a:endParaRPr lang="de-DE" dirty="0"/>
+          </a:p>
+        </p:txBody>
+      </p:sp>
+    </p:spTree>
+    <p:extLst>
+      <p:ext uri="{BB962C8B-B14F-4D97-AF65-F5344CB8AC3E}">
+        <p14:creationId xmlns:p14="http://schemas.microsoft.com/office/powerpoint/2010/main" val="4032297297"/>
+      </p:ext>
+    </p:extLst>
+  </p:cSld>
+  <p:clrMapOvr>
+    <a:masterClrMapping/>
+  </p:clrMapOvr>
+  <p:timing>
+    <p:tnLst>
+      <p:par>
+        <p:cTn id="1" dur="indefinite" restart="never" nodeType="tmRoot"/>
+      </p:par>
+    </p:tnLst>
+  </p:timing>
+</p:sld>
+</file>
+
+<file path=ppt/slides/slide17.xml><?xml version="1.0" encoding="utf-8"?>
+<p:sld xmlns:a="http://schemas.openxmlformats.org/drawingml/2006/main" xmlns:r="http://schemas.openxmlformats.org/officeDocument/2006/relationships" xmlns:p="http://schemas.openxmlformats.org/presentationml/2006/main">
+  <p:cSld>
+    <p:spTree>
+      <p:nvGrpSpPr>
+        <p:cNvPr id="1" name=""/>
+        <p:cNvGrpSpPr/>
+        <p:nvPr/>
+      </p:nvGrpSpPr>
+      <p:grpSpPr>
+        <a:xfrm>
+          <a:off x="0" y="0"/>
+          <a:ext cx="0" cy="0"/>
+          <a:chOff x="0" y="0"/>
+          <a:chExt cx="0" cy="0"/>
+        </a:xfrm>
+      </p:grpSpPr>
+      <p:sp>
+        <p:nvSpPr>
+          <p:cNvPr id="2" name="Titel 1"/>
+          <p:cNvSpPr>
+            <a:spLocks noGrp="1"/>
+          </p:cNvSpPr>
+          <p:nvPr>
+            <p:ph type="title"/>
+          </p:nvPr>
+        </p:nvSpPr>
+        <p:spPr/>
+        <p:txBody>
+          <a:bodyPr/>
+          <a:lstStyle/>
+          <a:p>
+            <a:r>
+              <a:rPr lang="de-DE" dirty="0" smtClean="0"/>
+              <a:t>Qualität</a:t>
+            </a:r>
+            <a:endParaRPr lang="de-DE" dirty="0"/>
+          </a:p>
+        </p:txBody>
+      </p:sp>
+      <p:sp>
+        <p:nvSpPr>
+          <p:cNvPr id="3" name="Inhaltsplatzhalter 2"/>
+          <p:cNvSpPr>
+            <a:spLocks noGrp="1"/>
+          </p:cNvSpPr>
+          <p:nvPr>
+            <p:ph idx="1"/>
+          </p:nvPr>
+        </p:nvSpPr>
+        <p:spPr/>
+        <p:txBody>
+          <a:bodyPr/>
+          <a:lstStyle/>
+          <a:p>
+            <a:r>
+              <a:rPr lang="en-US" dirty="0"/>
+              <a:t>Architecture</a:t>
+            </a:r>
+          </a:p>
+          <a:p>
+            <a:r>
+              <a:rPr lang="en-US" dirty="0"/>
+              <a:t>Version control</a:t>
+            </a:r>
+          </a:p>
+          <a:p>
+            <a:r>
+              <a:rPr lang="en-US" dirty="0"/>
+              <a:t>IDE and integration with sprints</a:t>
+            </a:r>
+          </a:p>
+          <a:p>
+            <a:r>
+              <a:rPr lang="en-US" dirty="0"/>
+              <a:t>Automated testing (functional / unit) and deployment</a:t>
+            </a:r>
+          </a:p>
+          <a:p>
+            <a:r>
+              <a:rPr lang="en-US" dirty="0"/>
+              <a:t>Metrics</a:t>
+            </a:r>
+          </a:p>
+          <a:p>
+            <a:r>
+              <a:rPr lang="en-US" dirty="0"/>
+              <a:t>Pattern use </a:t>
+            </a:r>
+          </a:p>
+          <a:p>
+            <a:endParaRPr lang="de-DE" dirty="0"/>
+          </a:p>
+        </p:txBody>
+      </p:sp>
+    </p:spTree>
+    <p:extLst>
+      <p:ext uri="{BB962C8B-B14F-4D97-AF65-F5344CB8AC3E}">
+        <p14:creationId xmlns:p14="http://schemas.microsoft.com/office/powerpoint/2010/main" val="3571126855"/>
+      </p:ext>
+    </p:extLst>
+  </p:cSld>
+  <p:clrMapOvr>
+    <a:masterClrMapping/>
+  </p:clrMapOvr>
+  <p:timing>
+    <p:tnLst>
+      <p:par>
+        <p:cTn id="1" dur="indefinite" restart="never" nodeType="tmRoot"/>
+      </p:par>
+    </p:tnLst>
+  </p:timing>
+</p:sld>
+</file>
+
+<file path=ppt/slides/slide18.xml><?xml version="1.0" encoding="utf-8"?>
+<p:sld xmlns:a="http://schemas.openxmlformats.org/drawingml/2006/main" xmlns:r="http://schemas.openxmlformats.org/officeDocument/2006/relationships" xmlns:p="http://schemas.openxmlformats.org/presentationml/2006/main">
+  <p:cSld>
+    <p:spTree>
+      <p:nvGrpSpPr>
+        <p:cNvPr id="1" name=""/>
+        <p:cNvGrpSpPr/>
+        <p:nvPr/>
+      </p:nvGrpSpPr>
+      <p:grpSpPr>
+        <a:xfrm>
+          <a:off x="0" y="0"/>
+          <a:ext cx="0" cy="0"/>
+          <a:chOff x="0" y="0"/>
+          <a:chExt cx="0" cy="0"/>
+        </a:xfrm>
+      </p:grpSpPr>
+      <p:sp>
+        <p:nvSpPr>
+          <p:cNvPr id="2" name="Titel 1"/>
+          <p:cNvSpPr>
+            <a:spLocks noGrp="1"/>
+          </p:cNvSpPr>
+          <p:nvPr>
+            <p:ph type="title"/>
+          </p:nvPr>
+        </p:nvSpPr>
+        <p:spPr/>
+        <p:txBody>
+          <a:bodyPr/>
+          <a:lstStyle/>
+          <a:p>
+            <a:r>
+              <a:rPr lang="de-DE" dirty="0" smtClean="0"/>
+              <a:t>DB-Schema</a:t>
+            </a:r>
+            <a:endParaRPr lang="de-DE" dirty="0"/>
+          </a:p>
+        </p:txBody>
+      </p:sp>
+      <p:pic>
+        <p:nvPicPr>
+          <p:cNvPr id="4" name="Inhaltsplatzhalter 3"/>
+          <p:cNvPicPr>
+            <a:picLocks noGrp="1"/>
+          </p:cNvPicPr>
+          <p:nvPr>
+            <p:ph idx="1"/>
+          </p:nvPr>
+        </p:nvPicPr>
+        <p:blipFill>
+          <a:blip r:embed="rId2" cstate="print">
+            <a:extLst>
+              <a:ext uri="{28A0092B-C50C-407E-A947-70E740481C1C}">
+                <a14:useLocalDpi xmlns:a14="http://schemas.microsoft.com/office/drawing/2010/main" val="0"/>
+              </a:ext>
+            </a:extLst>
+          </a:blip>
+          <a:srcRect/>
+          <a:stretch>
+            <a:fillRect/>
+          </a:stretch>
+        </p:blipFill>
+        <p:spPr bwMode="auto">
+          <a:xfrm>
+            <a:off x="1762968" y="1600200"/>
+            <a:ext cx="5618063" cy="4708525"/>
+          </a:xfrm>
+          <a:prstGeom prst="rect">
+            <a:avLst/>
+          </a:prstGeom>
+          <a:noFill/>
+          <a:ln>
+            <a:noFill/>
+          </a:ln>
+        </p:spPr>
+      </p:pic>
+    </p:spTree>
+    <p:extLst>
+      <p:ext uri="{BB962C8B-B14F-4D97-AF65-F5344CB8AC3E}">
+        <p14:creationId xmlns:p14="http://schemas.microsoft.com/office/powerpoint/2010/main" val="1339092845"/>
+      </p:ext>
+    </p:extLst>
+  </p:cSld>
+  <p:clrMapOvr>
+    <a:masterClrMapping/>
+  </p:clrMapOvr>
+  <p:timing>
+    <p:tnLst>
+      <p:par>
+        <p:cTn id="1" dur="indefinite" restart="never" nodeType="tmRoot"/>
+      </p:par>
+    </p:tnLst>
+  </p:timing>
+</p:sld>
+</file>
+
+<file path=ppt/slides/slide19.xml><?xml version="1.0" encoding="utf-8"?>
+<p:sld xmlns:a="http://schemas.openxmlformats.org/drawingml/2006/main" xmlns:r="http://schemas.openxmlformats.org/officeDocument/2006/relationships" xmlns:p="http://schemas.openxmlformats.org/presentationml/2006/main">
+  <p:cSld>
+    <p:spTree>
+      <p:nvGrpSpPr>
+        <p:cNvPr id="1" name=""/>
+        <p:cNvGrpSpPr/>
+        <p:nvPr/>
+      </p:nvGrpSpPr>
+      <p:grpSpPr>
+        <a:xfrm>
+          <a:off x="0" y="0"/>
+          <a:ext cx="0" cy="0"/>
+          <a:chOff x="0" y="0"/>
+          <a:chExt cx="0" cy="0"/>
+        </a:xfrm>
+      </p:grpSpPr>
+      <p:sp>
+        <p:nvSpPr>
+          <p:cNvPr id="2" name="Titel 1"/>
+          <p:cNvSpPr>
+            <a:spLocks noGrp="1"/>
+          </p:cNvSpPr>
+          <p:nvPr>
+            <p:ph type="title"/>
+          </p:nvPr>
+        </p:nvSpPr>
+        <p:spPr/>
+        <p:txBody>
+          <a:bodyPr/>
+          <a:lstStyle/>
+          <a:p>
+            <a:r>
+              <a:rPr lang="de-DE" dirty="0" err="1" smtClean="0"/>
+              <a:t>Deployment</a:t>
+            </a:r>
+            <a:r>
+              <a:rPr lang="de-DE" dirty="0" smtClean="0"/>
+              <a:t> View</a:t>
+            </a:r>
+            <a:endParaRPr lang="de-DE" dirty="0"/>
+          </a:p>
+        </p:txBody>
+      </p:sp>
+      <p:pic>
+        <p:nvPicPr>
+          <p:cNvPr id="4" name="Inhaltsplatzhalter 3" descr="DeploymentView.png"/>
+          <p:cNvPicPr>
+            <a:picLocks noGrp="1" noChangeAspect="1"/>
+          </p:cNvPicPr>
+          <p:nvPr>
+            <p:ph idx="1"/>
+          </p:nvPr>
+        </p:nvPicPr>
+        <p:blipFill>
+          <a:blip r:embed="rId2" cstate="print"/>
+          <a:stretch>
+            <a:fillRect/>
+          </a:stretch>
+        </p:blipFill>
+        <p:spPr>
+          <a:xfrm>
+            <a:off x="2052939" y="1600200"/>
+            <a:ext cx="5038122" cy="4708525"/>
+          </a:xfrm>
+        </p:spPr>
+      </p:pic>
+    </p:spTree>
+    <p:extLst>
+      <p:ext uri="{BB962C8B-B14F-4D97-AF65-F5344CB8AC3E}">
+        <p14:creationId xmlns:p14="http://schemas.microsoft.com/office/powerpoint/2010/main" val="836769455"/>
+      </p:ext>
+    </p:extLst>
+  </p:cSld>
+  <p:clrMapOvr>
+    <a:masterClrMapping/>
+  </p:clrMapOvr>
+  <p:timing>
+    <p:tnLst>
+      <p:par>
+        <p:cTn id="1" dur="indefinite" restart="never" nodeType="tmRoot"/>
+      </p:par>
+    </p:tnLst>
+  </p:timing>
+</p:sld>
+</file>
+
 <file path=ppt/slides/slide2.xml><?xml version="1.0" encoding="utf-8"?>
 <p:sld xmlns:a="http://schemas.openxmlformats.org/drawingml/2006/main" xmlns:r="http://schemas.openxmlformats.org/officeDocument/2006/relationships" xmlns:p="http://schemas.openxmlformats.org/presentationml/2006/main">
   <p:cSld>
@@ -3232,6 +4297,181 @@
     <p:extLst>
       <p:ext uri="{BB962C8B-B14F-4D97-AF65-F5344CB8AC3E}">
         <p14:creationId xmlns:p14="http://schemas.microsoft.com/office/powerpoint/2010/main" val="1379296497"/>
+      </p:ext>
+    </p:extLst>
+  </p:cSld>
+  <p:clrMapOvr>
+    <a:masterClrMapping/>
+  </p:clrMapOvr>
+  <p:timing>
+    <p:tnLst>
+      <p:par>
+        <p:cTn id="1" dur="indefinite" restart="never" nodeType="tmRoot"/>
+      </p:par>
+    </p:tnLst>
+  </p:timing>
+</p:sld>
+</file>
+
+<file path=ppt/slides/slide20.xml><?xml version="1.0" encoding="utf-8"?>
+<p:sld xmlns:a="http://schemas.openxmlformats.org/drawingml/2006/main" xmlns:r="http://schemas.openxmlformats.org/officeDocument/2006/relationships" xmlns:p="http://schemas.openxmlformats.org/presentationml/2006/main">
+  <p:cSld>
+    <p:spTree>
+      <p:nvGrpSpPr>
+        <p:cNvPr id="1" name=""/>
+        <p:cNvGrpSpPr/>
+        <p:nvPr/>
+      </p:nvGrpSpPr>
+      <p:grpSpPr>
+        <a:xfrm>
+          <a:off x="0" y="0"/>
+          <a:ext cx="0" cy="0"/>
+          <a:chOff x="0" y="0"/>
+          <a:chExt cx="0" cy="0"/>
+        </a:xfrm>
+      </p:grpSpPr>
+      <p:sp>
+        <p:nvSpPr>
+          <p:cNvPr id="2" name="Titel 1"/>
+          <p:cNvSpPr>
+            <a:spLocks noGrp="1"/>
+          </p:cNvSpPr>
+          <p:nvPr>
+            <p:ph type="title"/>
+          </p:nvPr>
+        </p:nvSpPr>
+        <p:spPr/>
+        <p:txBody>
+          <a:bodyPr/>
+          <a:lstStyle/>
+          <a:p>
+            <a:r>
+              <a:rPr lang="de-DE" dirty="0" smtClean="0"/>
+              <a:t>Link</a:t>
+            </a:r>
+            <a:endParaRPr lang="de-DE" dirty="0"/>
+          </a:p>
+        </p:txBody>
+      </p:sp>
+      <p:sp>
+        <p:nvSpPr>
+          <p:cNvPr id="3" name="Inhaltsplatzhalter 2"/>
+          <p:cNvSpPr>
+            <a:spLocks noGrp="1"/>
+          </p:cNvSpPr>
+          <p:nvPr>
+            <p:ph idx="1"/>
+          </p:nvPr>
+        </p:nvSpPr>
+        <p:spPr/>
+        <p:txBody>
+          <a:bodyPr/>
+          <a:lstStyle/>
+          <a:p>
+            <a:r>
+              <a:rPr lang="de-DE" dirty="0" smtClean="0"/>
+              <a:t>Blog:</a:t>
+            </a:r>
+          </a:p>
+          <a:p>
+            <a:pPr marL="137160" indent="0">
+              <a:buNone/>
+            </a:pPr>
+            <a:r>
+              <a:rPr lang="de-DE" dirty="0">
+                <a:hlinkClick r:id="rId2"/>
+              </a:rPr>
+              <a:t>https://www.coursesites.com/webapps/portal/frameset.jsp?tab_tab_group_id=null&amp;url=%2Fwebapps%2Fblackboard%2Fexecute%2Flauncher%3Ftype%3DCourse%26id%3D_261651_1%26url%3D</a:t>
+            </a:r>
+            <a:endParaRPr lang="de-DE" dirty="0"/>
+          </a:p>
+          <a:p>
+            <a:pPr marL="137160" indent="0">
+              <a:buNone/>
+            </a:pPr>
+            <a:endParaRPr lang="de-DE" dirty="0"/>
+          </a:p>
+        </p:txBody>
+      </p:sp>
+    </p:spTree>
+    <p:extLst>
+      <p:ext uri="{BB962C8B-B14F-4D97-AF65-F5344CB8AC3E}">
+        <p14:creationId xmlns:p14="http://schemas.microsoft.com/office/powerpoint/2010/main" val="1051875190"/>
+      </p:ext>
+    </p:extLst>
+  </p:cSld>
+  <p:clrMapOvr>
+    <a:masterClrMapping/>
+  </p:clrMapOvr>
+  <p:timing>
+    <p:tnLst>
+      <p:par>
+        <p:cTn id="1" dur="indefinite" restart="never" nodeType="tmRoot"/>
+      </p:par>
+    </p:tnLst>
+  </p:timing>
+</p:sld>
+</file>
+
+<file path=ppt/slides/slide21.xml><?xml version="1.0" encoding="utf-8"?>
+<p:sld xmlns:a="http://schemas.openxmlformats.org/drawingml/2006/main" xmlns:r="http://schemas.openxmlformats.org/officeDocument/2006/relationships" xmlns:p="http://schemas.openxmlformats.org/presentationml/2006/main">
+  <p:cSld>
+    <p:spTree>
+      <p:nvGrpSpPr>
+        <p:cNvPr id="1" name=""/>
+        <p:cNvGrpSpPr/>
+        <p:nvPr/>
+      </p:nvGrpSpPr>
+      <p:grpSpPr>
+        <a:xfrm>
+          <a:off x="0" y="0"/>
+          <a:ext cx="0" cy="0"/>
+          <a:chOff x="0" y="0"/>
+          <a:chExt cx="0" cy="0"/>
+        </a:xfrm>
+      </p:grpSpPr>
+      <p:sp>
+        <p:nvSpPr>
+          <p:cNvPr id="2" name="Titel 1"/>
+          <p:cNvSpPr>
+            <a:spLocks noGrp="1"/>
+          </p:cNvSpPr>
+          <p:nvPr>
+            <p:ph type="title"/>
+          </p:nvPr>
+        </p:nvSpPr>
+        <p:spPr/>
+        <p:txBody>
+          <a:bodyPr/>
+          <a:lstStyle/>
+          <a:p>
+            <a:endParaRPr lang="de-DE"/>
+          </a:p>
+        </p:txBody>
+      </p:sp>
+      <p:sp>
+        <p:nvSpPr>
+          <p:cNvPr id="3" name="Inhaltsplatzhalter 2"/>
+          <p:cNvSpPr>
+            <a:spLocks noGrp="1"/>
+          </p:cNvSpPr>
+          <p:nvPr>
+            <p:ph idx="1"/>
+          </p:nvPr>
+        </p:nvSpPr>
+        <p:spPr/>
+        <p:txBody>
+          <a:bodyPr/>
+          <a:lstStyle/>
+          <a:p>
+            <a:endParaRPr lang="de-DE"/>
+          </a:p>
+        </p:txBody>
+      </p:sp>
+    </p:spTree>
+    <p:extLst>
+      <p:ext uri="{BB962C8B-B14F-4D97-AF65-F5344CB8AC3E}">
+        <p14:creationId xmlns:p14="http://schemas.microsoft.com/office/powerpoint/2010/main" val="2507173618"/>
       </p:ext>
     </p:extLst>
   </p:cSld>
@@ -3280,7 +4520,11 @@
           <a:bodyPr/>
           <a:lstStyle/>
           <a:p>
-            <a:endParaRPr lang="de-DE"/>
+            <a:r>
+              <a:rPr lang="de-DE" dirty="0" smtClean="0"/>
+              <a:t>Rollenverteilung</a:t>
+            </a:r>
+            <a:endParaRPr lang="de-DE" dirty="0"/>
           </a:p>
         </p:txBody>
       </p:sp>
@@ -3299,14 +4543,47 @@
           <a:bodyPr/>
           <a:lstStyle/>
           <a:p>
-            <a:endParaRPr lang="de-DE"/>
+            <a:r>
+              <a:rPr lang="de-DE" dirty="0" smtClean="0"/>
+              <a:t>Tosten</a:t>
+            </a:r>
+          </a:p>
+          <a:p>
+            <a:pPr marL="137160" indent="0">
+              <a:buNone/>
+            </a:pPr>
+            <a:r>
+              <a:rPr lang="de-DE" dirty="0" smtClean="0">
+                <a:sym typeface="Wingdings" panose="05000000000000000000" pitchFamily="2" charset="2"/>
+              </a:rPr>
+              <a:t> Back-End, Implementieren, DB-Verwaltung</a:t>
+            </a:r>
+            <a:endParaRPr lang="de-DE" dirty="0"/>
+          </a:p>
+          <a:p>
+            <a:r>
+              <a:rPr lang="de-DE" dirty="0" smtClean="0"/>
+              <a:t>Wanping</a:t>
+            </a:r>
+          </a:p>
+          <a:p>
+            <a:pPr marL="137160" indent="0">
+              <a:buNone/>
+            </a:pPr>
+            <a:r>
+              <a:rPr lang="de-DE" dirty="0" smtClean="0">
+                <a:sym typeface="Wingdings" panose="05000000000000000000" pitchFamily="2" charset="2"/>
+              </a:rPr>
+              <a:t> Front-End, Projektmanagement, Implementieren</a:t>
+            </a:r>
+            <a:endParaRPr lang="de-DE" dirty="0"/>
           </a:p>
         </p:txBody>
       </p:sp>
     </p:spTree>
     <p:extLst>
       <p:ext uri="{BB962C8B-B14F-4D97-AF65-F5344CB8AC3E}">
-        <p14:creationId xmlns:p14="http://schemas.microsoft.com/office/powerpoint/2010/main" val="3751821349"/>
+        <p14:creationId xmlns:p14="http://schemas.microsoft.com/office/powerpoint/2010/main" val="122813725"/>
       </p:ext>
     </p:extLst>
   </p:cSld>
@@ -3355,39 +4632,438 @@
           <a:bodyPr/>
           <a:lstStyle/>
           <a:p>
-            <a:endParaRPr lang="de-DE"/>
-          </a:p>
-        </p:txBody>
-      </p:sp>
-      <p:sp>
-        <p:nvSpPr>
-          <p:cNvPr id="3" name="Inhaltsplatzhalter 2"/>
-          <p:cNvSpPr>
-            <a:spLocks noGrp="1"/>
-          </p:cNvSpPr>
+            <a:r>
+              <a:rPr lang="de-DE" dirty="0" smtClean="0"/>
+              <a:t>SRS</a:t>
+            </a:r>
+            <a:endParaRPr lang="de-DE" dirty="0"/>
+          </a:p>
+        </p:txBody>
+      </p:sp>
+      <p:graphicFrame>
+        <p:nvGraphicFramePr>
+          <p:cNvPr id="4" name="Inhaltsplatzhalter 3"/>
+          <p:cNvGraphicFramePr>
+            <a:graphicFrameLocks noGrp="1"/>
+          </p:cNvGraphicFramePr>
           <p:nvPr>
             <p:ph idx="1"/>
-          </p:nvPr>
-        </p:nvSpPr>
-        <p:spPr/>
-        <p:txBody>
-          <a:bodyPr/>
-          <a:lstStyle/>
-          <a:p>
-            <a:endParaRPr lang="de-DE"/>
-          </a:p>
-        </p:txBody>
-      </p:sp>
+            <p:extLst>
+              <p:ext uri="{D42A27DB-BD31-4B8C-83A1-F6EECF244321}">
+                <p14:modId xmlns:p14="http://schemas.microsoft.com/office/powerpoint/2010/main" val="3773691369"/>
+              </p:ext>
+            </p:extLst>
+          </p:nvPr>
+        </p:nvGraphicFramePr>
+        <p:xfrm>
+          <a:off x="467544" y="1988840"/>
+          <a:ext cx="8229600" cy="2865120"/>
+        </p:xfrm>
+        <a:graphic>
+          <a:graphicData uri="http://schemas.openxmlformats.org/drawingml/2006/table">
+            <a:tbl>
+              <a:tblPr firstRow="1" bandRow="1">
+                <a:tableStyleId>{5C22544A-7EE6-4342-B048-85BDC9FD1C3A}</a:tableStyleId>
+              </a:tblPr>
+              <a:tblGrid>
+                <a:gridCol w="3826768"/>
+                <a:gridCol w="1512168"/>
+                <a:gridCol w="1440160"/>
+                <a:gridCol w="1450504"/>
+              </a:tblGrid>
+              <a:tr h="370840">
+                <a:tc>
+                  <a:txBody>
+                    <a:bodyPr/>
+                    <a:lstStyle/>
+                    <a:p>
+                      <a:endParaRPr lang="de-DE" dirty="0"/>
+                    </a:p>
+                  </a:txBody>
+                  <a:tcPr/>
+                </a:tc>
+                <a:tc>
+                  <a:txBody>
+                    <a:bodyPr/>
+                    <a:lstStyle/>
+                    <a:p>
+                      <a:r>
+                        <a:rPr lang="de-DE" dirty="0" smtClean="0"/>
+                        <a:t>Relevant</a:t>
+                      </a:r>
+                      <a:endParaRPr lang="de-DE" dirty="0"/>
+                    </a:p>
+                  </a:txBody>
+                  <a:tcPr/>
+                </a:tc>
+                <a:tc>
+                  <a:txBody>
+                    <a:bodyPr/>
+                    <a:lstStyle/>
+                    <a:p>
+                      <a:r>
+                        <a:rPr lang="de-DE" dirty="0" smtClean="0"/>
+                        <a:t>Bedingt relevant</a:t>
+                      </a:r>
+                      <a:endParaRPr lang="de-DE" dirty="0"/>
+                    </a:p>
+                  </a:txBody>
+                  <a:tcPr/>
+                </a:tc>
+                <a:tc>
+                  <a:txBody>
+                    <a:bodyPr/>
+                    <a:lstStyle/>
+                    <a:p>
+                      <a:r>
+                        <a:rPr lang="de-DE" dirty="0" smtClean="0"/>
+                        <a:t>Wenig relevant</a:t>
+                      </a:r>
+                      <a:endParaRPr lang="de-DE" dirty="0"/>
+                    </a:p>
+                  </a:txBody>
+                  <a:tcPr/>
+                </a:tc>
+              </a:tr>
+              <a:tr h="370840">
+                <a:tc>
+                  <a:txBody>
+                    <a:bodyPr/>
+                    <a:lstStyle/>
+                    <a:p>
+                      <a:r>
+                        <a:rPr lang="de-DE" dirty="0" smtClean="0"/>
+                        <a:t>Benutzerfreundlichkeit</a:t>
+                      </a:r>
+                      <a:endParaRPr lang="de-DE" dirty="0"/>
+                    </a:p>
+                  </a:txBody>
+                  <a:tcPr/>
+                </a:tc>
+                <a:tc>
+                  <a:txBody>
+                    <a:bodyPr/>
+                    <a:lstStyle/>
+                    <a:p>
+                      <a:pPr algn="ctr"/>
+                      <a:r>
+                        <a:rPr lang="de-DE" dirty="0" smtClean="0"/>
+                        <a:t>X</a:t>
+                      </a:r>
+                      <a:endParaRPr lang="de-DE" dirty="0"/>
+                    </a:p>
+                  </a:txBody>
+                  <a:tcPr/>
+                </a:tc>
+                <a:tc>
+                  <a:txBody>
+                    <a:bodyPr/>
+                    <a:lstStyle/>
+                    <a:p>
+                      <a:pPr algn="ctr"/>
+                      <a:endParaRPr lang="de-DE" dirty="0"/>
+                    </a:p>
+                  </a:txBody>
+                  <a:tcPr/>
+                </a:tc>
+                <a:tc>
+                  <a:txBody>
+                    <a:bodyPr/>
+                    <a:lstStyle/>
+                    <a:p>
+                      <a:pPr algn="ctr"/>
+                      <a:endParaRPr lang="de-DE" dirty="0"/>
+                    </a:p>
+                  </a:txBody>
+                  <a:tcPr/>
+                </a:tc>
+              </a:tr>
+              <a:tr h="370840">
+                <a:tc>
+                  <a:txBody>
+                    <a:bodyPr/>
+                    <a:lstStyle/>
+                    <a:p>
+                      <a:r>
+                        <a:rPr lang="de-DE" dirty="0" smtClean="0"/>
+                        <a:t>Sicherheit</a:t>
+                      </a:r>
+                      <a:endParaRPr lang="de-DE" dirty="0"/>
+                    </a:p>
+                  </a:txBody>
+                  <a:tcPr/>
+                </a:tc>
+                <a:tc>
+                  <a:txBody>
+                    <a:bodyPr/>
+                    <a:lstStyle/>
+                    <a:p>
+                      <a:pPr algn="ctr"/>
+                      <a:endParaRPr lang="de-DE" dirty="0"/>
+                    </a:p>
+                  </a:txBody>
+                  <a:tcPr/>
+                </a:tc>
+                <a:tc>
+                  <a:txBody>
+                    <a:bodyPr/>
+                    <a:lstStyle/>
+                    <a:p>
+                      <a:pPr algn="ctr"/>
+                      <a:r>
+                        <a:rPr lang="de-DE" dirty="0" smtClean="0"/>
+                        <a:t>X</a:t>
+                      </a:r>
+                      <a:endParaRPr lang="de-DE" dirty="0"/>
+                    </a:p>
+                  </a:txBody>
+                  <a:tcPr/>
+                </a:tc>
+                <a:tc>
+                  <a:txBody>
+                    <a:bodyPr/>
+                    <a:lstStyle/>
+                    <a:p>
+                      <a:pPr algn="ctr"/>
+                      <a:endParaRPr lang="de-DE" dirty="0"/>
+                    </a:p>
+                  </a:txBody>
+                  <a:tcPr/>
+                </a:tc>
+              </a:tr>
+              <a:tr h="370840">
+                <a:tc>
+                  <a:txBody>
+                    <a:bodyPr/>
+                    <a:lstStyle/>
+                    <a:p>
+                      <a:r>
+                        <a:rPr lang="de-DE" dirty="0" smtClean="0"/>
+                        <a:t>Qualität</a:t>
+                      </a:r>
+                      <a:endParaRPr lang="de-DE" dirty="0"/>
+                    </a:p>
+                  </a:txBody>
+                  <a:tcPr/>
+                </a:tc>
+                <a:tc>
+                  <a:txBody>
+                    <a:bodyPr/>
+                    <a:lstStyle/>
+                    <a:p>
+                      <a:pPr algn="ctr"/>
+                      <a:r>
+                        <a:rPr lang="de-DE" dirty="0" smtClean="0"/>
+                        <a:t>X</a:t>
+                      </a:r>
+                      <a:endParaRPr lang="de-DE" dirty="0"/>
+                    </a:p>
+                  </a:txBody>
+                  <a:tcPr/>
+                </a:tc>
+                <a:tc>
+                  <a:txBody>
+                    <a:bodyPr/>
+                    <a:lstStyle/>
+                    <a:p>
+                      <a:pPr algn="ctr"/>
+                      <a:endParaRPr lang="de-DE" dirty="0"/>
+                    </a:p>
+                  </a:txBody>
+                  <a:tcPr/>
+                </a:tc>
+                <a:tc>
+                  <a:txBody>
+                    <a:bodyPr/>
+                    <a:lstStyle/>
+                    <a:p>
+                      <a:pPr algn="ctr"/>
+                      <a:endParaRPr lang="de-DE" dirty="0"/>
+                    </a:p>
+                  </a:txBody>
+                  <a:tcPr/>
+                </a:tc>
+              </a:tr>
+              <a:tr h="370840">
+                <a:tc>
+                  <a:txBody>
+                    <a:bodyPr/>
+                    <a:lstStyle/>
+                    <a:p>
+                      <a:r>
+                        <a:rPr lang="de-DE" dirty="0" smtClean="0"/>
+                        <a:t>Anschauliches Design</a:t>
+                      </a:r>
+                      <a:endParaRPr lang="de-DE" dirty="0"/>
+                    </a:p>
+                  </a:txBody>
+                  <a:tcPr/>
+                </a:tc>
+                <a:tc>
+                  <a:txBody>
+                    <a:bodyPr/>
+                    <a:lstStyle/>
+                    <a:p>
+                      <a:pPr algn="ctr"/>
+                      <a:r>
+                        <a:rPr lang="de-DE" dirty="0" smtClean="0"/>
+                        <a:t>X</a:t>
+                      </a:r>
+                      <a:endParaRPr lang="de-DE" dirty="0"/>
+                    </a:p>
+                  </a:txBody>
+                  <a:tcPr/>
+                </a:tc>
+                <a:tc>
+                  <a:txBody>
+                    <a:bodyPr/>
+                    <a:lstStyle/>
+                    <a:p>
+                      <a:pPr algn="ctr"/>
+                      <a:endParaRPr lang="de-DE" dirty="0"/>
+                    </a:p>
+                  </a:txBody>
+                  <a:tcPr/>
+                </a:tc>
+                <a:tc>
+                  <a:txBody>
+                    <a:bodyPr/>
+                    <a:lstStyle/>
+                    <a:p>
+                      <a:pPr algn="ctr"/>
+                      <a:endParaRPr lang="de-DE" dirty="0"/>
+                    </a:p>
+                  </a:txBody>
+                  <a:tcPr/>
+                </a:tc>
+              </a:tr>
+              <a:tr h="370840">
+                <a:tc>
+                  <a:txBody>
+                    <a:bodyPr/>
+                    <a:lstStyle/>
+                    <a:p>
+                      <a:r>
+                        <a:rPr lang="de-DE" dirty="0" smtClean="0"/>
+                        <a:t>Mobilität</a:t>
+                      </a:r>
+                      <a:endParaRPr lang="de-DE" dirty="0"/>
+                    </a:p>
+                  </a:txBody>
+                  <a:tcPr/>
+                </a:tc>
+                <a:tc>
+                  <a:txBody>
+                    <a:bodyPr/>
+                    <a:lstStyle/>
+                    <a:p>
+                      <a:pPr algn="ctr"/>
+                      <a:endParaRPr lang="de-DE" dirty="0"/>
+                    </a:p>
+                  </a:txBody>
+                  <a:tcPr/>
+                </a:tc>
+                <a:tc>
+                  <a:txBody>
+                    <a:bodyPr/>
+                    <a:lstStyle/>
+                    <a:p>
+                      <a:pPr algn="ctr"/>
+                      <a:endParaRPr lang="de-DE" dirty="0"/>
+                    </a:p>
+                  </a:txBody>
+                  <a:tcPr/>
+                </a:tc>
+                <a:tc>
+                  <a:txBody>
+                    <a:bodyPr/>
+                    <a:lstStyle/>
+                    <a:p>
+                      <a:pPr algn="ctr"/>
+                      <a:r>
+                        <a:rPr lang="de-DE" dirty="0" smtClean="0"/>
+                        <a:t>X</a:t>
+                      </a:r>
+                      <a:endParaRPr lang="de-DE" dirty="0"/>
+                    </a:p>
+                  </a:txBody>
+                  <a:tcPr/>
+                </a:tc>
+              </a:tr>
+              <a:tr h="370840">
+                <a:tc>
+                  <a:txBody>
+                    <a:bodyPr/>
+                    <a:lstStyle/>
+                    <a:p>
+                      <a:r>
+                        <a:rPr lang="de-DE" dirty="0" smtClean="0"/>
+                        <a:t>Datenschutz</a:t>
+                      </a:r>
+                      <a:endParaRPr lang="de-DE" dirty="0"/>
+                    </a:p>
+                  </a:txBody>
+                  <a:tcPr/>
+                </a:tc>
+                <a:tc>
+                  <a:txBody>
+                    <a:bodyPr/>
+                    <a:lstStyle/>
+                    <a:p>
+                      <a:pPr algn="ctr"/>
+                      <a:r>
+                        <a:rPr lang="de-DE" dirty="0" smtClean="0"/>
+                        <a:t>x</a:t>
+                      </a:r>
+                      <a:endParaRPr lang="de-DE" dirty="0"/>
+                    </a:p>
+                  </a:txBody>
+                  <a:tcPr/>
+                </a:tc>
+                <a:tc>
+                  <a:txBody>
+                    <a:bodyPr/>
+                    <a:lstStyle/>
+                    <a:p>
+                      <a:pPr algn="ctr"/>
+                      <a:endParaRPr lang="de-DE" dirty="0"/>
+                    </a:p>
+                  </a:txBody>
+                  <a:tcPr/>
+                </a:tc>
+                <a:tc>
+                  <a:txBody>
+                    <a:bodyPr/>
+                    <a:lstStyle/>
+                    <a:p>
+                      <a:pPr algn="ctr"/>
+                      <a:endParaRPr lang="de-DE" dirty="0"/>
+                    </a:p>
+                  </a:txBody>
+                  <a:tcPr/>
+                </a:tc>
+              </a:tr>
+            </a:tbl>
+          </a:graphicData>
+        </a:graphic>
+      </p:graphicFrame>
     </p:spTree>
     <p:extLst>
       <p:ext uri="{BB962C8B-B14F-4D97-AF65-F5344CB8AC3E}">
-        <p14:creationId xmlns:p14="http://schemas.microsoft.com/office/powerpoint/2010/main" val="583094061"/>
+        <p14:creationId xmlns:p14="http://schemas.microsoft.com/office/powerpoint/2010/main" val="1110645122"/>
       </p:ext>
     </p:extLst>
   </p:cSld>
   <p:clrMapOvr>
     <a:masterClrMapping/>
   </p:clrMapOvr>
+  <p:timing>
+    <p:tnLst>
+      <p:par>
+        <p:cTn id="1" dur="indefinite" restart="never" nodeType="tmRoot"/>
+      </p:par>
+    </p:tnLst>
+  </p:timing>
 </p:sld>
 </file>
 
@@ -3423,33 +5099,419 @@
           <a:bodyPr/>
           <a:lstStyle/>
           <a:p>
-            <a:endParaRPr lang="de-DE"/>
-          </a:p>
-        </p:txBody>
-      </p:sp>
-      <p:sp>
-        <p:nvSpPr>
-          <p:cNvPr id="3" name="Inhaltsplatzhalter 2"/>
-          <p:cNvSpPr>
-            <a:spLocks noGrp="1"/>
-          </p:cNvSpPr>
+            <a:r>
+              <a:rPr lang="de-DE" dirty="0" smtClean="0"/>
+              <a:t>SRS</a:t>
+            </a:r>
+            <a:endParaRPr lang="de-DE" dirty="0"/>
+          </a:p>
+        </p:txBody>
+      </p:sp>
+      <p:pic>
+        <p:nvPicPr>
+          <p:cNvPr id="4" name="Inhaltsplatzhalter 3"/>
+          <p:cNvPicPr>
+            <a:picLocks noGrp="1" noChangeAspect="1"/>
+          </p:cNvPicPr>
           <p:nvPr>
             <p:ph idx="1"/>
           </p:nvPr>
-        </p:nvSpPr>
-        <p:spPr/>
-        <p:txBody>
-          <a:bodyPr/>
-          <a:lstStyle/>
-          <a:p>
-            <a:endParaRPr lang="de-DE"/>
-          </a:p>
-        </p:txBody>
-      </p:sp>
+        </p:nvPicPr>
+        <p:blipFill>
+          <a:blip r:embed="rId2">
+            <a:extLst>
+              <a:ext uri="{28A0092B-C50C-407E-A947-70E740481C1C}">
+                <a14:useLocalDpi xmlns:a14="http://schemas.microsoft.com/office/drawing/2010/main" val="0"/>
+              </a:ext>
+            </a:extLst>
+          </a:blip>
+          <a:stretch>
+            <a:fillRect/>
+          </a:stretch>
+        </p:blipFill>
+        <p:spPr>
+          <a:xfrm>
+            <a:off x="1775304" y="1600200"/>
+            <a:ext cx="5593391" cy="4708525"/>
+          </a:xfrm>
+        </p:spPr>
+      </p:pic>
+    </p:spTree>
+    <p:extLst>
+      <p:ext uri="{BB962C8B-B14F-4D97-AF65-F5344CB8AC3E}">
+        <p14:creationId xmlns:p14="http://schemas.microsoft.com/office/powerpoint/2010/main" val="3154589865"/>
+      </p:ext>
+    </p:extLst>
+  </p:cSld>
+  <p:clrMapOvr>
+    <a:masterClrMapping/>
+  </p:clrMapOvr>
+  <p:timing>
+    <p:tnLst>
+      <p:par>
+        <p:cTn id="1" dur="indefinite" restart="never" nodeType="tmRoot"/>
+      </p:par>
+    </p:tnLst>
+  </p:timing>
+</p:sld>
+</file>
+
+<file path=ppt/slides/slide6.xml><?xml version="1.0" encoding="utf-8"?>
+<p:sld xmlns:a="http://schemas.openxmlformats.org/drawingml/2006/main" xmlns:r="http://schemas.openxmlformats.org/officeDocument/2006/relationships" xmlns:p="http://schemas.openxmlformats.org/presentationml/2006/main">
+  <p:cSld>
+    <p:spTree>
+      <p:nvGrpSpPr>
+        <p:cNvPr id="1" name=""/>
+        <p:cNvGrpSpPr/>
+        <p:nvPr/>
+      </p:nvGrpSpPr>
+      <p:grpSpPr>
+        <a:xfrm>
+          <a:off x="0" y="0"/>
+          <a:ext cx="0" cy="0"/>
+          <a:chOff x="0" y="0"/>
+          <a:chExt cx="0" cy="0"/>
+        </a:xfrm>
+      </p:grpSpPr>
+      <p:sp>
+        <p:nvSpPr>
+          <p:cNvPr id="2" name="Titel 1"/>
+          <p:cNvSpPr>
+            <a:spLocks noGrp="1"/>
+          </p:cNvSpPr>
+          <p:nvPr>
+            <p:ph type="title"/>
+          </p:nvPr>
+        </p:nvSpPr>
+        <p:spPr/>
+        <p:txBody>
+          <a:bodyPr/>
+          <a:lstStyle/>
+          <a:p>
+            <a:r>
+              <a:rPr lang="de-DE" dirty="0" err="1" smtClean="0"/>
+              <a:t>Use</a:t>
+            </a:r>
+            <a:r>
+              <a:rPr lang="de-DE" dirty="0" smtClean="0"/>
+              <a:t>-Case: Ausleihen</a:t>
+            </a:r>
+            <a:endParaRPr lang="de-DE" dirty="0"/>
+          </a:p>
+        </p:txBody>
+      </p:sp>
+      <p:pic>
+        <p:nvPicPr>
+          <p:cNvPr id="4" name="Inhaltsplatzhalter 3"/>
+          <p:cNvPicPr>
+            <a:picLocks noGrp="1" noChangeAspect="1"/>
+          </p:cNvPicPr>
+          <p:nvPr>
+            <p:ph idx="1"/>
+          </p:nvPr>
+        </p:nvPicPr>
+        <p:blipFill>
+          <a:blip r:embed="rId2">
+            <a:extLst>
+              <a:ext uri="{28A0092B-C50C-407E-A947-70E740481C1C}">
+                <a14:useLocalDpi xmlns:a14="http://schemas.microsoft.com/office/drawing/2010/main" val="0"/>
+              </a:ext>
+            </a:extLst>
+          </a:blip>
+          <a:stretch>
+            <a:fillRect/>
+          </a:stretch>
+        </p:blipFill>
+        <p:spPr>
+          <a:xfrm>
+            <a:off x="2805583" y="1600200"/>
+            <a:ext cx="3532834" cy="4708525"/>
+          </a:xfrm>
+        </p:spPr>
+      </p:pic>
+    </p:spTree>
+    <p:extLst>
+      <p:ext uri="{BB962C8B-B14F-4D97-AF65-F5344CB8AC3E}">
+        <p14:creationId xmlns:p14="http://schemas.microsoft.com/office/powerpoint/2010/main" val="3751821349"/>
+      </p:ext>
+    </p:extLst>
+  </p:cSld>
+  <p:clrMapOvr>
+    <a:masterClrMapping/>
+  </p:clrMapOvr>
+  <p:timing>
+    <p:tnLst>
+      <p:par>
+        <p:cTn id="1" dur="indefinite" restart="never" nodeType="tmRoot"/>
+      </p:par>
+    </p:tnLst>
+  </p:timing>
+</p:sld>
+</file>
+
+<file path=ppt/slides/slide7.xml><?xml version="1.0" encoding="utf-8"?>
+<p:sld xmlns:a="http://schemas.openxmlformats.org/drawingml/2006/main" xmlns:r="http://schemas.openxmlformats.org/officeDocument/2006/relationships" xmlns:p="http://schemas.openxmlformats.org/presentationml/2006/main">
+  <p:cSld>
+    <p:spTree>
+      <p:nvGrpSpPr>
+        <p:cNvPr id="1" name=""/>
+        <p:cNvGrpSpPr/>
+        <p:nvPr/>
+      </p:nvGrpSpPr>
+      <p:grpSpPr>
+        <a:xfrm>
+          <a:off x="0" y="0"/>
+          <a:ext cx="0" cy="0"/>
+          <a:chOff x="0" y="0"/>
+          <a:chExt cx="0" cy="0"/>
+        </a:xfrm>
+      </p:grpSpPr>
+      <p:sp>
+        <p:nvSpPr>
+          <p:cNvPr id="2" name="Titel 1"/>
+          <p:cNvSpPr>
+            <a:spLocks noGrp="1"/>
+          </p:cNvSpPr>
+          <p:nvPr>
+            <p:ph type="title"/>
+          </p:nvPr>
+        </p:nvSpPr>
+        <p:spPr/>
+        <p:txBody>
+          <a:bodyPr/>
+          <a:lstStyle/>
+          <a:p>
+            <a:r>
+              <a:rPr lang="de-DE" dirty="0" err="1" smtClean="0"/>
+              <a:t>Use</a:t>
+            </a:r>
+            <a:r>
+              <a:rPr lang="de-DE" dirty="0" smtClean="0"/>
+              <a:t>-Case: Suchen</a:t>
+            </a:r>
+            <a:endParaRPr lang="de-DE" dirty="0"/>
+          </a:p>
+        </p:txBody>
+      </p:sp>
+      <p:pic>
+        <p:nvPicPr>
+          <p:cNvPr id="4" name="Inhaltsplatzhalter 3"/>
+          <p:cNvPicPr>
+            <a:picLocks noGrp="1" noChangeAspect="1"/>
+          </p:cNvPicPr>
+          <p:nvPr>
+            <p:ph idx="1"/>
+          </p:nvPr>
+        </p:nvPicPr>
+        <p:blipFill>
+          <a:blip r:embed="rId2">
+            <a:extLst>
+              <a:ext uri="{28A0092B-C50C-407E-A947-70E740481C1C}">
+                <a14:useLocalDpi xmlns:a14="http://schemas.microsoft.com/office/drawing/2010/main" val="0"/>
+              </a:ext>
+            </a:extLst>
+          </a:blip>
+          <a:stretch>
+            <a:fillRect/>
+          </a:stretch>
+        </p:blipFill>
+        <p:spPr>
+          <a:xfrm>
+            <a:off x="2805583" y="1600200"/>
+            <a:ext cx="3532834" cy="4708525"/>
+          </a:xfrm>
+        </p:spPr>
+      </p:pic>
+    </p:spTree>
+    <p:extLst>
+      <p:ext uri="{BB962C8B-B14F-4D97-AF65-F5344CB8AC3E}">
+        <p14:creationId xmlns:p14="http://schemas.microsoft.com/office/powerpoint/2010/main" val="583094061"/>
+      </p:ext>
+    </p:extLst>
+  </p:cSld>
+  <p:clrMapOvr>
+    <a:masterClrMapping/>
+  </p:clrMapOvr>
+  <p:timing>
+    <p:tnLst>
+      <p:par>
+        <p:cTn id="1" dur="indefinite" restart="never" nodeType="tmRoot"/>
+      </p:par>
+    </p:tnLst>
+  </p:timing>
+</p:sld>
+</file>
+
+<file path=ppt/slides/slide8.xml><?xml version="1.0" encoding="utf-8"?>
+<p:sld xmlns:a="http://schemas.openxmlformats.org/drawingml/2006/main" xmlns:r="http://schemas.openxmlformats.org/officeDocument/2006/relationships" xmlns:p="http://schemas.openxmlformats.org/presentationml/2006/main">
+  <p:cSld>
+    <p:spTree>
+      <p:nvGrpSpPr>
+        <p:cNvPr id="1" name=""/>
+        <p:cNvGrpSpPr/>
+        <p:nvPr/>
+      </p:nvGrpSpPr>
+      <p:grpSpPr>
+        <a:xfrm>
+          <a:off x="0" y="0"/>
+          <a:ext cx="0" cy="0"/>
+          <a:chOff x="0" y="0"/>
+          <a:chExt cx="0" cy="0"/>
+        </a:xfrm>
+      </p:grpSpPr>
+      <p:sp>
+        <p:nvSpPr>
+          <p:cNvPr id="2" name="Titel 1"/>
+          <p:cNvSpPr>
+            <a:spLocks noGrp="1"/>
+          </p:cNvSpPr>
+          <p:nvPr>
+            <p:ph type="title"/>
+          </p:nvPr>
+        </p:nvSpPr>
+        <p:spPr/>
+        <p:txBody>
+          <a:bodyPr/>
+          <a:lstStyle/>
+          <a:p>
+            <a:r>
+              <a:rPr lang="de-DE" dirty="0" err="1" smtClean="0"/>
+              <a:t>Use</a:t>
+            </a:r>
+            <a:r>
+              <a:rPr lang="de-DE" dirty="0" smtClean="0"/>
+              <a:t>-Case: Daten eingeben</a:t>
+            </a:r>
+            <a:endParaRPr lang="de-DE" dirty="0"/>
+          </a:p>
+        </p:txBody>
+      </p:sp>
+      <p:pic>
+        <p:nvPicPr>
+          <p:cNvPr id="4" name="Inhaltsplatzhalter 3"/>
+          <p:cNvPicPr>
+            <a:picLocks noGrp="1" noChangeAspect="1"/>
+          </p:cNvPicPr>
+          <p:nvPr>
+            <p:ph idx="1"/>
+          </p:nvPr>
+        </p:nvPicPr>
+        <p:blipFill>
+          <a:blip r:embed="rId2">
+            <a:extLst>
+              <a:ext uri="{28A0092B-C50C-407E-A947-70E740481C1C}">
+                <a14:useLocalDpi xmlns:a14="http://schemas.microsoft.com/office/drawing/2010/main" val="0"/>
+              </a:ext>
+            </a:extLst>
+          </a:blip>
+          <a:stretch>
+            <a:fillRect/>
+          </a:stretch>
+        </p:blipFill>
+        <p:spPr>
+          <a:xfrm>
+            <a:off x="2805583" y="1600200"/>
+            <a:ext cx="3532834" cy="4708525"/>
+          </a:xfrm>
+        </p:spPr>
+      </p:pic>
     </p:spTree>
     <p:extLst>
       <p:ext uri="{BB962C8B-B14F-4D97-AF65-F5344CB8AC3E}">
         <p14:creationId xmlns:p14="http://schemas.microsoft.com/office/powerpoint/2010/main" val="1324022627"/>
+      </p:ext>
+    </p:extLst>
+  </p:cSld>
+  <p:clrMapOvr>
+    <a:masterClrMapping/>
+  </p:clrMapOvr>
+  <p:timing>
+    <p:tnLst>
+      <p:par>
+        <p:cTn id="1" dur="indefinite" restart="never" nodeType="tmRoot"/>
+      </p:par>
+    </p:tnLst>
+  </p:timing>
+</p:sld>
+</file>
+
+<file path=ppt/slides/slide9.xml><?xml version="1.0" encoding="utf-8"?>
+<p:sld xmlns:a="http://schemas.openxmlformats.org/drawingml/2006/main" xmlns:r="http://schemas.openxmlformats.org/officeDocument/2006/relationships" xmlns:p="http://schemas.openxmlformats.org/presentationml/2006/main">
+  <p:cSld>
+    <p:spTree>
+      <p:nvGrpSpPr>
+        <p:cNvPr id="1" name=""/>
+        <p:cNvGrpSpPr/>
+        <p:nvPr/>
+      </p:nvGrpSpPr>
+      <p:grpSpPr>
+        <a:xfrm>
+          <a:off x="0" y="0"/>
+          <a:ext cx="0" cy="0"/>
+          <a:chOff x="0" y="0"/>
+          <a:chExt cx="0" cy="0"/>
+        </a:xfrm>
+      </p:grpSpPr>
+      <p:sp>
+        <p:nvSpPr>
+          <p:cNvPr id="2" name="Titel 1"/>
+          <p:cNvSpPr>
+            <a:spLocks noGrp="1"/>
+          </p:cNvSpPr>
+          <p:nvPr>
+            <p:ph type="title"/>
+          </p:nvPr>
+        </p:nvSpPr>
+        <p:spPr/>
+        <p:txBody>
+          <a:bodyPr/>
+          <a:lstStyle/>
+          <a:p>
+            <a:r>
+              <a:rPr lang="de-DE" dirty="0" err="1" smtClean="0"/>
+              <a:t>Use</a:t>
+            </a:r>
+            <a:r>
+              <a:rPr lang="de-DE" dirty="0" smtClean="0"/>
+              <a:t>-Case: Information Laden</a:t>
+            </a:r>
+            <a:endParaRPr lang="de-DE" dirty="0"/>
+          </a:p>
+        </p:txBody>
+      </p:sp>
+      <p:pic>
+        <p:nvPicPr>
+          <p:cNvPr id="4" name="Inhaltsplatzhalter 3"/>
+          <p:cNvPicPr>
+            <a:picLocks noGrp="1" noChangeAspect="1"/>
+          </p:cNvPicPr>
+          <p:nvPr>
+            <p:ph idx="1"/>
+          </p:nvPr>
+        </p:nvPicPr>
+        <p:blipFill>
+          <a:blip r:embed="rId2">
+            <a:extLst>
+              <a:ext uri="{28A0092B-C50C-407E-A947-70E740481C1C}">
+                <a14:useLocalDpi xmlns:a14="http://schemas.microsoft.com/office/drawing/2010/main" val="0"/>
+              </a:ext>
+            </a:extLst>
+          </a:blip>
+          <a:stretch>
+            <a:fillRect/>
+          </a:stretch>
+        </p:blipFill>
+        <p:spPr>
+          <a:xfrm>
+            <a:off x="2805583" y="1600200"/>
+            <a:ext cx="3532834" cy="4708525"/>
+          </a:xfrm>
+        </p:spPr>
+      </p:pic>
+    </p:spTree>
+    <p:extLst>
+      <p:ext uri="{BB962C8B-B14F-4D97-AF65-F5344CB8AC3E}">
+        <p14:creationId xmlns:p14="http://schemas.microsoft.com/office/powerpoint/2010/main" val="2984375108"/>
       </p:ext>
     </p:extLst>
   </p:cSld>

</xml_diff>

<commit_message>
Link zur Demo angepasst
</commit_message>
<xml_diff>
--- a/Final Project Handin/Final Presentation/Online-Library.pptx
+++ b/Final Project Handin/Final Presentation/Online-Library.pptx
@@ -127,6 +127,22 @@
       </a:defRPr>
     </a:lvl9pPr>
   </p:defaultTextStyle>
+  <p:extLst>
+    <p:ext uri="{EFAFB233-063F-42B5-8137-9DF3F51BA10A}">
+      <p15:sldGuideLst xmlns:p15="http://schemas.microsoft.com/office/powerpoint/2012/main">
+        <p15:guide id="1" orient="horz" pos="2160">
+          <p15:clr>
+            <a:srgbClr val="A4A3A4"/>
+          </p15:clr>
+        </p15:guide>
+        <p15:guide id="2" pos="2880">
+          <p15:clr>
+            <a:srgbClr val="A4A3A4"/>
+          </p15:clr>
+        </p15:guide>
+      </p15:sldGuideLst>
+    </p:ext>
+  </p:extLst>
 </p:presentation>
 </file>
 
@@ -241,7 +257,7 @@
           <a:p>
             <a:fld id="{C542B042-146A-4BF0-A56A-76E3CE54648B}" type="datetimeFigureOut">
               <a:rPr lang="de-DE" smtClean="0"/>
-              <a:t>10.06.2014</a:t>
+              <a:t>11.06.2014</a:t>
             </a:fld>
             <a:endParaRPr lang="de-DE"/>
           </a:p>
@@ -467,7 +483,7 @@
           <a:p>
             <a:fld id="{C542B042-146A-4BF0-A56A-76E3CE54648B}" type="datetimeFigureOut">
               <a:rPr lang="de-DE" smtClean="0"/>
-              <a:t>10.06.2014</a:t>
+              <a:t>11.06.2014</a:t>
             </a:fld>
             <a:endParaRPr lang="de-DE"/>
           </a:p>
@@ -642,7 +658,7 @@
           <a:p>
             <a:fld id="{C542B042-146A-4BF0-A56A-76E3CE54648B}" type="datetimeFigureOut">
               <a:rPr lang="de-DE" smtClean="0"/>
-              <a:t>10.06.2014</a:t>
+              <a:t>11.06.2014</a:t>
             </a:fld>
             <a:endParaRPr lang="de-DE"/>
           </a:p>
@@ -807,7 +823,7 @@
           <a:p>
             <a:fld id="{C542B042-146A-4BF0-A56A-76E3CE54648B}" type="datetimeFigureOut">
               <a:rPr lang="de-DE" smtClean="0"/>
-              <a:t>10.06.2014</a:t>
+              <a:t>11.06.2014</a:t>
             </a:fld>
             <a:endParaRPr lang="de-DE"/>
           </a:p>
@@ -1051,7 +1067,7 @@
           <a:p>
             <a:fld id="{C542B042-146A-4BF0-A56A-76E3CE54648B}" type="datetimeFigureOut">
               <a:rPr lang="de-DE" smtClean="0"/>
-              <a:t>10.06.2014</a:t>
+              <a:t>11.06.2014</a:t>
             </a:fld>
             <a:endParaRPr lang="de-DE"/>
           </a:p>
@@ -1315,7 +1331,7 @@
           <a:p>
             <a:fld id="{C542B042-146A-4BF0-A56A-76E3CE54648B}" type="datetimeFigureOut">
               <a:rPr lang="de-DE" smtClean="0"/>
-              <a:t>10.06.2014</a:t>
+              <a:t>11.06.2014</a:t>
             </a:fld>
             <a:endParaRPr lang="de-DE"/>
           </a:p>
@@ -1689,7 +1705,7 @@
           <a:p>
             <a:fld id="{C542B042-146A-4BF0-A56A-76E3CE54648B}" type="datetimeFigureOut">
               <a:rPr lang="de-DE" smtClean="0"/>
-              <a:t>10.06.2014</a:t>
+              <a:t>11.06.2014</a:t>
             </a:fld>
             <a:endParaRPr lang="de-DE"/>
           </a:p>
@@ -1802,7 +1818,7 @@
           <a:p>
             <a:fld id="{C542B042-146A-4BF0-A56A-76E3CE54648B}" type="datetimeFigureOut">
               <a:rPr lang="de-DE" smtClean="0"/>
-              <a:t>10.06.2014</a:t>
+              <a:t>11.06.2014</a:t>
             </a:fld>
             <a:endParaRPr lang="de-DE"/>
           </a:p>
@@ -1892,7 +1908,7 @@
           <a:p>
             <a:fld id="{C542B042-146A-4BF0-A56A-76E3CE54648B}" type="datetimeFigureOut">
               <a:rPr lang="de-DE" smtClean="0"/>
-              <a:t>10.06.2014</a:t>
+              <a:t>11.06.2014</a:t>
             </a:fld>
             <a:endParaRPr lang="de-DE"/>
           </a:p>
@@ -2150,7 +2166,7 @@
           <a:p>
             <a:fld id="{C542B042-146A-4BF0-A56A-76E3CE54648B}" type="datetimeFigureOut">
               <a:rPr lang="de-DE" smtClean="0"/>
-              <a:t>10.06.2014</a:t>
+              <a:t>11.06.2014</a:t>
             </a:fld>
             <a:endParaRPr lang="de-DE"/>
           </a:p>
@@ -2414,7 +2430,7 @@
           <a:p>
             <a:fld id="{C542B042-146A-4BF0-A56A-76E3CE54648B}" type="datetimeFigureOut">
               <a:rPr lang="de-DE" smtClean="0"/>
-              <a:t>10.06.2014</a:t>
+              <a:t>11.06.2014</a:t>
             </a:fld>
             <a:endParaRPr lang="de-DE"/>
           </a:p>
@@ -2631,7 +2647,7 @@
           <a:p>
             <a:fld id="{C542B042-146A-4BF0-A56A-76E3CE54648B}" type="datetimeFigureOut">
               <a:rPr lang="de-DE" smtClean="0"/>
-              <a:t>10.06.2014</a:t>
+              <a:t>11.06.2014</a:t>
             </a:fld>
             <a:endParaRPr lang="de-DE"/>
           </a:p>
@@ -3582,7 +3598,25 @@
               <a:rPr lang="de-DE" dirty="0">
                 <a:hlinkClick r:id="rId2"/>
               </a:rPr>
-              <a:t>http://torsten-werner.com/OnLibDev/</a:t>
+              <a:t>http</a:t>
+            </a:r>
+            <a:r>
+              <a:rPr lang="de-DE">
+                <a:hlinkClick r:id="rId2"/>
+              </a:rPr>
+              <a:t>://</a:t>
+            </a:r>
+            <a:r>
+              <a:rPr lang="de-DE" smtClean="0">
+                <a:hlinkClick r:id="rId2"/>
+              </a:rPr>
+              <a:t>torsten-werner.com/OnLib/OnLibDev</a:t>
+            </a:r>
+            <a:r>
+              <a:rPr lang="de-DE" dirty="0">
+                <a:hlinkClick r:id="rId2"/>
+              </a:rPr>
+              <a:t>/</a:t>
             </a:r>
             <a:endParaRPr lang="de-DE" dirty="0"/>
           </a:p>

</xml_diff>

<commit_message>
Final Presentation paar Sachen eingefügt
</commit_message>
<xml_diff>
--- a/Final Project Handin/Final Presentation/Online-Library.pptx
+++ b/Final Project Handin/Final Presentation/Online-Library.pptx
@@ -129,7 +129,7 @@
   </p:defaultTextStyle>
   <p:extLst>
     <p:ext uri="{EFAFB233-063F-42B5-8137-9DF3F51BA10A}">
-      <p15:sldGuideLst xmlns:p15="http://schemas.microsoft.com/office/powerpoint/2012/main">
+      <p15:sldGuideLst xmlns:p15="http://schemas.microsoft.com/office/powerpoint/2012/main" xmlns="">
         <p15:guide id="1" orient="horz" pos="2160">
           <p15:clr>
             <a:srgbClr val="A4A3A4"/>
@@ -257,7 +257,7 @@
           <a:p>
             <a:fld id="{C542B042-146A-4BF0-A56A-76E3CE54648B}" type="datetimeFigureOut">
               <a:rPr lang="de-DE" smtClean="0"/>
-              <a:t>11.06.2014</a:t>
+              <a:t>15.06.2014</a:t>
             </a:fld>
             <a:endParaRPr lang="de-DE"/>
           </a:p>
@@ -483,7 +483,7 @@
           <a:p>
             <a:fld id="{C542B042-146A-4BF0-A56A-76E3CE54648B}" type="datetimeFigureOut">
               <a:rPr lang="de-DE" smtClean="0"/>
-              <a:t>11.06.2014</a:t>
+              <a:t>15.06.2014</a:t>
             </a:fld>
             <a:endParaRPr lang="de-DE"/>
           </a:p>
@@ -658,7 +658,7 @@
           <a:p>
             <a:fld id="{C542B042-146A-4BF0-A56A-76E3CE54648B}" type="datetimeFigureOut">
               <a:rPr lang="de-DE" smtClean="0"/>
-              <a:t>11.06.2014</a:t>
+              <a:t>15.06.2014</a:t>
             </a:fld>
             <a:endParaRPr lang="de-DE"/>
           </a:p>
@@ -823,7 +823,7 @@
           <a:p>
             <a:fld id="{C542B042-146A-4BF0-A56A-76E3CE54648B}" type="datetimeFigureOut">
               <a:rPr lang="de-DE" smtClean="0"/>
-              <a:t>11.06.2014</a:t>
+              <a:t>15.06.2014</a:t>
             </a:fld>
             <a:endParaRPr lang="de-DE"/>
           </a:p>
@@ -1067,7 +1067,7 @@
           <a:p>
             <a:fld id="{C542B042-146A-4BF0-A56A-76E3CE54648B}" type="datetimeFigureOut">
               <a:rPr lang="de-DE" smtClean="0"/>
-              <a:t>11.06.2014</a:t>
+              <a:t>15.06.2014</a:t>
             </a:fld>
             <a:endParaRPr lang="de-DE"/>
           </a:p>
@@ -1331,7 +1331,7 @@
           <a:p>
             <a:fld id="{C542B042-146A-4BF0-A56A-76E3CE54648B}" type="datetimeFigureOut">
               <a:rPr lang="de-DE" smtClean="0"/>
-              <a:t>11.06.2014</a:t>
+              <a:t>15.06.2014</a:t>
             </a:fld>
             <a:endParaRPr lang="de-DE"/>
           </a:p>
@@ -1705,7 +1705,7 @@
           <a:p>
             <a:fld id="{C542B042-146A-4BF0-A56A-76E3CE54648B}" type="datetimeFigureOut">
               <a:rPr lang="de-DE" smtClean="0"/>
-              <a:t>11.06.2014</a:t>
+              <a:t>15.06.2014</a:t>
             </a:fld>
             <a:endParaRPr lang="de-DE"/>
           </a:p>
@@ -1818,7 +1818,7 @@
           <a:p>
             <a:fld id="{C542B042-146A-4BF0-A56A-76E3CE54648B}" type="datetimeFigureOut">
               <a:rPr lang="de-DE" smtClean="0"/>
-              <a:t>11.06.2014</a:t>
+              <a:t>15.06.2014</a:t>
             </a:fld>
             <a:endParaRPr lang="de-DE"/>
           </a:p>
@@ -1908,7 +1908,7 @@
           <a:p>
             <a:fld id="{C542B042-146A-4BF0-A56A-76E3CE54648B}" type="datetimeFigureOut">
               <a:rPr lang="de-DE" smtClean="0"/>
-              <a:t>11.06.2014</a:t>
+              <a:t>15.06.2014</a:t>
             </a:fld>
             <a:endParaRPr lang="de-DE"/>
           </a:p>
@@ -2166,7 +2166,7 @@
           <a:p>
             <a:fld id="{C542B042-146A-4BF0-A56A-76E3CE54648B}" type="datetimeFigureOut">
               <a:rPr lang="de-DE" smtClean="0"/>
-              <a:t>11.06.2014</a:t>
+              <a:t>15.06.2014</a:t>
             </a:fld>
             <a:endParaRPr lang="de-DE"/>
           </a:p>
@@ -2430,7 +2430,7 @@
           <a:p>
             <a:fld id="{C542B042-146A-4BF0-A56A-76E3CE54648B}" type="datetimeFigureOut">
               <a:rPr lang="de-DE" smtClean="0"/>
-              <a:t>11.06.2014</a:t>
+              <a:t>15.06.2014</a:t>
             </a:fld>
             <a:endParaRPr lang="de-DE"/>
           </a:p>
@@ -2647,7 +2647,7 @@
           <a:p>
             <a:fld id="{C542B042-146A-4BF0-A56A-76E3CE54648B}" type="datetimeFigureOut">
               <a:rPr lang="de-DE" smtClean="0"/>
-              <a:t>11.06.2014</a:t>
+              <a:t>15.06.2014</a:t>
             </a:fld>
             <a:endParaRPr lang="de-DE"/>
           </a:p>
@@ -3381,50 +3381,44 @@
           <a:lstStyle/>
           <a:p>
             <a:r>
-              <a:rPr lang="en-US" dirty="0"/>
+              <a:rPr lang="en-US" dirty="0" smtClean="0"/>
               <a:t>Project </a:t>
             </a:r>
             <a:r>
-              <a:rPr lang="en-US" dirty="0" err="1"/>
+              <a:rPr lang="en-US" dirty="0" err="1" smtClean="0"/>
               <a:t>managmeent</a:t>
             </a:r>
-            <a:endParaRPr lang="en-US" dirty="0"/>
-          </a:p>
-          <a:p>
-            <a:r>
-              <a:rPr lang="en-US" dirty="0" err="1"/>
+            <a:endParaRPr lang="en-US" dirty="0" smtClean="0"/>
+          </a:p>
+          <a:p>
+            <a:r>
+              <a:rPr lang="en-US" dirty="0" err="1" smtClean="0"/>
               <a:t>MSProject</a:t>
             </a:r>
-            <a:endParaRPr lang="en-US" dirty="0"/>
-          </a:p>
-          <a:p>
-            <a:r>
-              <a:rPr lang="en-US" dirty="0"/>
+            <a:endParaRPr lang="en-US" dirty="0" smtClean="0"/>
+          </a:p>
+          <a:p>
+            <a:r>
+              <a:rPr lang="en-US" dirty="0" smtClean="0"/>
               <a:t>Sprint</a:t>
             </a:r>
           </a:p>
           <a:p>
             <a:r>
-              <a:rPr lang="en-US" dirty="0"/>
+              <a:rPr lang="en-US" dirty="0" smtClean="0"/>
               <a:t>Iterative Process</a:t>
             </a:r>
           </a:p>
           <a:p>
             <a:r>
-              <a:rPr lang="en-US" dirty="0"/>
+              <a:rPr lang="en-US" dirty="0" smtClean="0"/>
               <a:t>RUP</a:t>
             </a:r>
           </a:p>
           <a:p>
             <a:r>
-              <a:rPr lang="en-US" dirty="0"/>
+              <a:rPr lang="en-US" dirty="0" smtClean="0"/>
               <a:t>Explains what they are and why use them</a:t>
-            </a:r>
-          </a:p>
-          <a:p>
-            <a:r>
-              <a:rPr lang="en-US" dirty="0"/>
-              <a:t>FP project estimation</a:t>
             </a:r>
           </a:p>
           <a:p>
@@ -3496,25 +3490,35 @@
           </a:p>
         </p:txBody>
       </p:sp>
-      <p:sp>
-        <p:nvSpPr>
-          <p:cNvPr id="3" name="Inhaltsplatzhalter 2"/>
-          <p:cNvSpPr>
-            <a:spLocks noGrp="1"/>
-          </p:cNvSpPr>
+      <p:pic>
+        <p:nvPicPr>
+          <p:cNvPr id="4" name="Inhaltsplatzhalter 3"/>
+          <p:cNvPicPr>
+            <a:picLocks noGrp="1" noChangeAspect="1"/>
+          </p:cNvPicPr>
           <p:nvPr>
             <p:ph idx="1"/>
           </p:nvPr>
-        </p:nvSpPr>
-        <p:spPr/>
-        <p:txBody>
-          <a:bodyPr/>
-          <a:lstStyle/>
-          <a:p>
-            <a:endParaRPr lang="de-DE"/>
-          </a:p>
-        </p:txBody>
-      </p:sp>
+        </p:nvPicPr>
+        <p:blipFill>
+          <a:blip r:embed="rId2">
+            <a:extLst>
+              <a:ext uri="{28A0092B-C50C-407E-A947-70E740481C1C}">
+                <a14:useLocalDpi xmlns:a14="http://schemas.microsoft.com/office/drawing/2010/main" val="0"/>
+              </a:ext>
+            </a:extLst>
+          </a:blip>
+          <a:stretch>
+            <a:fillRect/>
+          </a:stretch>
+        </p:blipFill>
+        <p:spPr>
+          <a:xfrm>
+            <a:off x="545069" y="1600200"/>
+            <a:ext cx="8053862" cy="4708525"/>
+          </a:xfrm>
+        </p:spPr>
+      </p:pic>
     </p:spTree>
     <p:extLst>
       <p:ext uri="{BB962C8B-B14F-4D97-AF65-F5344CB8AC3E}">
@@ -4068,39 +4072,31 @@
       </p:sp>
       <p:pic>
         <p:nvPicPr>
-          <p:cNvPr id="4" name="Inhaltsplatzhalter 3"/>
+          <p:cNvPr id="5" name="Inhaltsplatzhalter 4"/>
           <p:cNvPicPr>
-            <a:picLocks noGrp="1"/>
+            <a:picLocks noGrp="1" noChangeAspect="1"/>
           </p:cNvPicPr>
           <p:nvPr>
             <p:ph idx="1"/>
           </p:nvPr>
         </p:nvPicPr>
         <p:blipFill>
-          <a:blip r:embed="rId2" cstate="print">
+          <a:blip r:embed="rId2">
             <a:extLst>
               <a:ext uri="{28A0092B-C50C-407E-A947-70E740481C1C}">
                 <a14:useLocalDpi xmlns:a14="http://schemas.microsoft.com/office/drawing/2010/main" val="0"/>
               </a:ext>
             </a:extLst>
           </a:blip>
-          <a:srcRect/>
           <a:stretch>
             <a:fillRect/>
           </a:stretch>
         </p:blipFill>
-        <p:spPr bwMode="auto">
+        <p:spPr>
           <a:xfrm>
-            <a:off x="1762968" y="1600200"/>
-            <a:ext cx="5618063" cy="4708525"/>
+            <a:off x="457200" y="1641017"/>
+            <a:ext cx="8229600" cy="4626890"/>
           </a:xfrm>
-          <a:prstGeom prst="rect">
-            <a:avLst/>
-          </a:prstGeom>
-          <a:noFill/>
-          <a:ln>
-            <a:noFill/>
-          </a:ln>
         </p:spPr>
       </p:pic>
     </p:spTree>

</xml_diff>

<commit_message>
neues DbSchema und CodeMap eingefügt
</commit_message>
<xml_diff>
--- a/Final Project Handin/Final Presentation/Online-Library.pptx
+++ b/Final Project Handin/Final Presentation/Online-Library.pptx
@@ -23,14 +23,15 @@
     <p:sldId id="271" r:id="rId17"/>
     <p:sldId id="276" r:id="rId18"/>
     <p:sldId id="272" r:id="rId19"/>
-    <p:sldId id="274" r:id="rId20"/>
-    <p:sldId id="273" r:id="rId21"/>
-    <p:sldId id="275" r:id="rId22"/>
+    <p:sldId id="278" r:id="rId20"/>
+    <p:sldId id="274" r:id="rId21"/>
+    <p:sldId id="273" r:id="rId22"/>
+    <p:sldId id="275" r:id="rId23"/>
   </p:sldIdLst>
   <p:sldSz cx="9144000" cy="6858000" type="screen4x3"/>
   <p:notesSz cx="6858000" cy="9144000"/>
   <p:custDataLst>
-    <p:tags r:id="rId23"/>
+    <p:tags r:id="rId24"/>
   </p:custDataLst>
   <p:defaultTextStyle>
     <a:defPPr>
@@ -129,7 +130,7 @@
   </p:defaultTextStyle>
   <p:extLst>
     <p:ext uri="{EFAFB233-063F-42B5-8137-9DF3F51BA10A}">
-      <p15:sldGuideLst xmlns:p15="http://schemas.microsoft.com/office/powerpoint/2012/main" xmlns="">
+      <p15:sldGuideLst xmlns:p15="http://schemas.microsoft.com/office/powerpoint/2012/main">
         <p15:guide id="1" orient="horz" pos="2160">
           <p15:clr>
             <a:srgbClr val="A4A3A4"/>
@@ -257,7 +258,7 @@
           <a:p>
             <a:fld id="{C542B042-146A-4BF0-A56A-76E3CE54648B}" type="datetimeFigureOut">
               <a:rPr lang="de-DE" smtClean="0"/>
-              <a:t>15.06.2014</a:t>
+              <a:t>16.06.2014</a:t>
             </a:fld>
             <a:endParaRPr lang="de-DE"/>
           </a:p>
@@ -483,7 +484,7 @@
           <a:p>
             <a:fld id="{C542B042-146A-4BF0-A56A-76E3CE54648B}" type="datetimeFigureOut">
               <a:rPr lang="de-DE" smtClean="0"/>
-              <a:t>15.06.2014</a:t>
+              <a:t>16.06.2014</a:t>
             </a:fld>
             <a:endParaRPr lang="de-DE"/>
           </a:p>
@@ -658,7 +659,7 @@
           <a:p>
             <a:fld id="{C542B042-146A-4BF0-A56A-76E3CE54648B}" type="datetimeFigureOut">
               <a:rPr lang="de-DE" smtClean="0"/>
-              <a:t>15.06.2014</a:t>
+              <a:t>16.06.2014</a:t>
             </a:fld>
             <a:endParaRPr lang="de-DE"/>
           </a:p>
@@ -823,7 +824,7 @@
           <a:p>
             <a:fld id="{C542B042-146A-4BF0-A56A-76E3CE54648B}" type="datetimeFigureOut">
               <a:rPr lang="de-DE" smtClean="0"/>
-              <a:t>15.06.2014</a:t>
+              <a:t>16.06.2014</a:t>
             </a:fld>
             <a:endParaRPr lang="de-DE"/>
           </a:p>
@@ -1067,7 +1068,7 @@
           <a:p>
             <a:fld id="{C542B042-146A-4BF0-A56A-76E3CE54648B}" type="datetimeFigureOut">
               <a:rPr lang="de-DE" smtClean="0"/>
-              <a:t>15.06.2014</a:t>
+              <a:t>16.06.2014</a:t>
             </a:fld>
             <a:endParaRPr lang="de-DE"/>
           </a:p>
@@ -1331,7 +1332,7 @@
           <a:p>
             <a:fld id="{C542B042-146A-4BF0-A56A-76E3CE54648B}" type="datetimeFigureOut">
               <a:rPr lang="de-DE" smtClean="0"/>
-              <a:t>15.06.2014</a:t>
+              <a:t>16.06.2014</a:t>
             </a:fld>
             <a:endParaRPr lang="de-DE"/>
           </a:p>
@@ -1705,7 +1706,7 @@
           <a:p>
             <a:fld id="{C542B042-146A-4BF0-A56A-76E3CE54648B}" type="datetimeFigureOut">
               <a:rPr lang="de-DE" smtClean="0"/>
-              <a:t>15.06.2014</a:t>
+              <a:t>16.06.2014</a:t>
             </a:fld>
             <a:endParaRPr lang="de-DE"/>
           </a:p>
@@ -1818,7 +1819,7 @@
           <a:p>
             <a:fld id="{C542B042-146A-4BF0-A56A-76E3CE54648B}" type="datetimeFigureOut">
               <a:rPr lang="de-DE" smtClean="0"/>
-              <a:t>15.06.2014</a:t>
+              <a:t>16.06.2014</a:t>
             </a:fld>
             <a:endParaRPr lang="de-DE"/>
           </a:p>
@@ -1908,7 +1909,7 @@
           <a:p>
             <a:fld id="{C542B042-146A-4BF0-A56A-76E3CE54648B}" type="datetimeFigureOut">
               <a:rPr lang="de-DE" smtClean="0"/>
-              <a:t>15.06.2014</a:t>
+              <a:t>16.06.2014</a:t>
             </a:fld>
             <a:endParaRPr lang="de-DE"/>
           </a:p>
@@ -2166,7 +2167,7 @@
           <a:p>
             <a:fld id="{C542B042-146A-4BF0-A56A-76E3CE54648B}" type="datetimeFigureOut">
               <a:rPr lang="de-DE" smtClean="0"/>
-              <a:t>15.06.2014</a:t>
+              <a:t>16.06.2014</a:t>
             </a:fld>
             <a:endParaRPr lang="de-DE"/>
           </a:p>
@@ -2430,7 +2431,7 @@
           <a:p>
             <a:fld id="{C542B042-146A-4BF0-A56A-76E3CE54648B}" type="datetimeFigureOut">
               <a:rPr lang="de-DE" smtClean="0"/>
-              <a:t>15.06.2014</a:t>
+              <a:t>16.06.2014</a:t>
             </a:fld>
             <a:endParaRPr lang="de-DE"/>
           </a:p>
@@ -2647,7 +2648,7 @@
           <a:p>
             <a:fld id="{C542B042-146A-4BF0-A56A-76E3CE54648B}" type="datetimeFigureOut">
               <a:rPr lang="de-DE" smtClean="0"/>
-              <a:t>15.06.2014</a:t>
+              <a:t>16.06.2014</a:t>
             </a:fld>
             <a:endParaRPr lang="de-DE"/>
           </a:p>
@@ -4070,33 +4071,47 @@
           </a:p>
         </p:txBody>
       </p:sp>
+      <p:sp>
+        <p:nvSpPr>
+          <p:cNvPr id="3" name="Inhaltsplatzhalter 2"/>
+          <p:cNvSpPr>
+            <a:spLocks noGrp="1"/>
+          </p:cNvSpPr>
+          <p:nvPr>
+            <p:ph idx="1"/>
+          </p:nvPr>
+        </p:nvSpPr>
+        <p:spPr/>
+        <p:txBody>
+          <a:bodyPr/>
+          <a:lstStyle/>
+          <a:p>
+            <a:endParaRPr lang="de-DE"/>
+          </a:p>
+        </p:txBody>
+      </p:sp>
       <p:pic>
         <p:nvPicPr>
-          <p:cNvPr id="5" name="Inhaltsplatzhalter 4"/>
+          <p:cNvPr id="4" name="Grafik 3"/>
           <p:cNvPicPr>
-            <a:picLocks noGrp="1" noChangeAspect="1"/>
+            <a:picLocks noChangeAspect="1"/>
           </p:cNvPicPr>
-          <p:nvPr>
-            <p:ph idx="1"/>
-          </p:nvPr>
+          <p:nvPr/>
         </p:nvPicPr>
         <p:blipFill>
-          <a:blip r:embed="rId2">
-            <a:extLst>
-              <a:ext uri="{28A0092B-C50C-407E-A947-70E740481C1C}">
-                <a14:useLocalDpi xmlns:a14="http://schemas.microsoft.com/office/drawing/2010/main" val="0"/>
-              </a:ext>
-            </a:extLst>
-          </a:blip>
+          <a:blip r:embed="rId2"/>
           <a:stretch>
             <a:fillRect/>
           </a:stretch>
         </p:blipFill>
         <p:spPr>
           <a:xfrm>
-            <a:off x="457200" y="1641017"/>
-            <a:ext cx="8229600" cy="4626890"/>
+            <a:off x="374579" y="1569953"/>
+            <a:ext cx="8394842" cy="4739407"/>
           </a:xfrm>
+          <a:prstGeom prst="rect">
+            <a:avLst/>
+          </a:prstGeom>
         </p:spPr>
       </p:pic>
     </p:spTree>
@@ -4152,12 +4167,8 @@
           <a:lstStyle/>
           <a:p>
             <a:r>
-              <a:rPr lang="de-DE" dirty="0" err="1" smtClean="0"/>
-              <a:t>Deployment</a:t>
-            </a:r>
-            <a:r>
               <a:rPr lang="de-DE" dirty="0" smtClean="0"/>
-              <a:t> View</a:t>
+              <a:t>Klassendiagramm</a:t>
             </a:r>
             <a:endParaRPr lang="de-DE" dirty="0"/>
           </a:p>
@@ -4165,7 +4176,7 @@
       </p:sp>
       <p:pic>
         <p:nvPicPr>
-          <p:cNvPr id="4" name="Inhaltsplatzhalter 3" descr="DeploymentView.png"/>
+          <p:cNvPr id="4" name="Inhaltsplatzhalter 3"/>
           <p:cNvPicPr>
             <a:picLocks noGrp="1" noChangeAspect="1"/>
           </p:cNvPicPr>
@@ -4174,35 +4185,34 @@
           </p:nvPr>
         </p:nvPicPr>
         <p:blipFill>
-          <a:blip r:embed="rId2" cstate="print"/>
+          <a:blip r:embed="rId2">
+            <a:extLst>
+              <a:ext uri="{28A0092B-C50C-407E-A947-70E740481C1C}">
+                <a14:useLocalDpi xmlns:a14="http://schemas.microsoft.com/office/drawing/2010/main" val="0"/>
+              </a:ext>
+            </a:extLst>
+          </a:blip>
           <a:stretch>
             <a:fillRect/>
           </a:stretch>
         </p:blipFill>
         <p:spPr>
           <a:xfrm>
-            <a:off x="2052939" y="1600200"/>
-            <a:ext cx="5038122" cy="4708525"/>
+            <a:off x="509020" y="2215907"/>
+            <a:ext cx="8125959" cy="3477110"/>
           </a:xfrm>
         </p:spPr>
       </p:pic>
     </p:spTree>
     <p:extLst>
       <p:ext uri="{BB962C8B-B14F-4D97-AF65-F5344CB8AC3E}">
-        <p14:creationId xmlns:p14="http://schemas.microsoft.com/office/powerpoint/2010/main" val="836769455"/>
+        <p14:creationId xmlns:p14="http://schemas.microsoft.com/office/powerpoint/2010/main" val="2049729842"/>
       </p:ext>
     </p:extLst>
   </p:cSld>
   <p:clrMapOvr>
     <a:masterClrMapping/>
   </p:clrMapOvr>
-  <p:timing>
-    <p:tnLst>
-      <p:par>
-        <p:cTn id="1" dur="indefinite" restart="never" nodeType="tmRoot"/>
-      </p:par>
-    </p:tnLst>
-  </p:timing>
 </p:sld>
 </file>
 
@@ -4376,6 +4386,93 @@
           <a:lstStyle/>
           <a:p>
             <a:r>
+              <a:rPr lang="de-DE" dirty="0" err="1" smtClean="0"/>
+              <a:t>Deployment</a:t>
+            </a:r>
+            <a:r>
+              <a:rPr lang="de-DE" dirty="0" smtClean="0"/>
+              <a:t> View</a:t>
+            </a:r>
+            <a:endParaRPr lang="de-DE" dirty="0"/>
+          </a:p>
+        </p:txBody>
+      </p:sp>
+      <p:pic>
+        <p:nvPicPr>
+          <p:cNvPr id="4" name="Inhaltsplatzhalter 3" descr="DeploymentView.png"/>
+          <p:cNvPicPr>
+            <a:picLocks noGrp="1" noChangeAspect="1"/>
+          </p:cNvPicPr>
+          <p:nvPr>
+            <p:ph idx="1"/>
+          </p:nvPr>
+        </p:nvPicPr>
+        <p:blipFill>
+          <a:blip r:embed="rId2" cstate="print"/>
+          <a:stretch>
+            <a:fillRect/>
+          </a:stretch>
+        </p:blipFill>
+        <p:spPr>
+          <a:xfrm>
+            <a:off x="2052939" y="1600200"/>
+            <a:ext cx="5038122" cy="4708525"/>
+          </a:xfrm>
+        </p:spPr>
+      </p:pic>
+    </p:spTree>
+    <p:extLst>
+      <p:ext uri="{BB962C8B-B14F-4D97-AF65-F5344CB8AC3E}">
+        <p14:creationId xmlns:p14="http://schemas.microsoft.com/office/powerpoint/2010/main" val="836769455"/>
+      </p:ext>
+    </p:extLst>
+  </p:cSld>
+  <p:clrMapOvr>
+    <a:masterClrMapping/>
+  </p:clrMapOvr>
+  <p:timing>
+    <p:tnLst>
+      <p:par>
+        <p:cTn id="1" dur="indefinite" restart="never" nodeType="tmRoot"/>
+      </p:par>
+    </p:tnLst>
+  </p:timing>
+</p:sld>
+</file>
+
+<file path=ppt/slides/slide21.xml><?xml version="1.0" encoding="utf-8"?>
+<p:sld xmlns:a="http://schemas.openxmlformats.org/drawingml/2006/main" xmlns:r="http://schemas.openxmlformats.org/officeDocument/2006/relationships" xmlns:p="http://schemas.openxmlformats.org/presentationml/2006/main">
+  <p:cSld>
+    <p:spTree>
+      <p:nvGrpSpPr>
+        <p:cNvPr id="1" name=""/>
+        <p:cNvGrpSpPr/>
+        <p:nvPr/>
+      </p:nvGrpSpPr>
+      <p:grpSpPr>
+        <a:xfrm>
+          <a:off x="0" y="0"/>
+          <a:ext cx="0" cy="0"/>
+          <a:chOff x="0" y="0"/>
+          <a:chExt cx="0" cy="0"/>
+        </a:xfrm>
+      </p:grpSpPr>
+      <p:sp>
+        <p:nvSpPr>
+          <p:cNvPr id="2" name="Titel 1"/>
+          <p:cNvSpPr>
+            <a:spLocks noGrp="1"/>
+          </p:cNvSpPr>
+          <p:nvPr>
+            <p:ph type="title"/>
+          </p:nvPr>
+        </p:nvSpPr>
+        <p:spPr/>
+        <p:txBody>
+          <a:bodyPr/>
+          <a:lstStyle/>
+          <a:p>
+            <a:r>
               <a:rPr lang="de-DE" dirty="0" smtClean="0"/>
               <a:t>Link</a:t>
             </a:r>
@@ -4443,7 +4540,7 @@
 </p:sld>
 </file>
 
-<file path=ppt/slides/slide21.xml><?xml version="1.0" encoding="utf-8"?>
+<file path=ppt/slides/slide22.xml><?xml version="1.0" encoding="utf-8"?>
 <p:sld xmlns:a="http://schemas.openxmlformats.org/drawingml/2006/main" xmlns:r="http://schemas.openxmlformats.org/officeDocument/2006/relationships" xmlns:p="http://schemas.openxmlformats.org/presentationml/2006/main">
   <p:cSld>
     <p:spTree>

</xml_diff>

<commit_message>
Link geändert und Extend of functionality erweitert
</commit_message>
<xml_diff>
--- a/Final Project Handin/Final Presentation/Online-Library.pptx
+++ b/Final Project Handin/Final Presentation/Online-Library.pptx
@@ -17,12 +17,12 @@
     <p:sldId id="267" r:id="rId11"/>
     <p:sldId id="269" r:id="rId12"/>
     <p:sldId id="270" r:id="rId13"/>
-    <p:sldId id="271" r:id="rId14"/>
-    <p:sldId id="272" r:id="rId15"/>
-    <p:sldId id="278" r:id="rId16"/>
-    <p:sldId id="274" r:id="rId17"/>
-    <p:sldId id="273" r:id="rId18"/>
-    <p:sldId id="275" r:id="rId19"/>
+    <p:sldId id="279" r:id="rId14"/>
+    <p:sldId id="271" r:id="rId15"/>
+    <p:sldId id="272" r:id="rId16"/>
+    <p:sldId id="278" r:id="rId17"/>
+    <p:sldId id="274" r:id="rId18"/>
+    <p:sldId id="273" r:id="rId19"/>
   </p:sldIdLst>
   <p:sldSz cx="9144000" cy="6858000" type="screen4x3"/>
   <p:notesSz cx="6858000" cy="9144000"/>
@@ -126,7 +126,7 @@
   </p:defaultTextStyle>
   <p:extLst>
     <p:ext uri="{EFAFB233-063F-42B5-8137-9DF3F51BA10A}">
-      <p15:sldGuideLst xmlns:p15="http://schemas.microsoft.com/office/powerpoint/2012/main">
+      <p15:sldGuideLst xmlns:p15="http://schemas.microsoft.com/office/powerpoint/2012/main" xmlns="">
         <p15:guide id="1" orient="horz" pos="2160">
           <p15:clr>
             <a:srgbClr val="A4A3A4"/>
@@ -3385,26 +3385,17 @@
               <a:rPr lang="de-DE" dirty="0">
                 <a:hlinkClick r:id="rId2"/>
               </a:rPr>
-              <a:t>http</a:t>
-            </a:r>
-            <a:r>
-              <a:rPr lang="de-DE">
-                <a:hlinkClick r:id="rId2"/>
-              </a:rPr>
-              <a:t>://</a:t>
-            </a:r>
-            <a:r>
-              <a:rPr lang="de-DE" smtClean="0">
-                <a:hlinkClick r:id="rId2"/>
-              </a:rPr>
-              <a:t>torsten-werner.com/OnLib/OnLib_Dev</a:t>
-            </a:r>
-            <a:r>
-              <a:rPr lang="de-DE" dirty="0">
+              <a:t>http://localhost:50090</a:t>
+            </a:r>
+            <a:r>
+              <a:rPr lang="de-DE" dirty="0" smtClean="0">
                 <a:hlinkClick r:id="rId2"/>
               </a:rPr>
               <a:t>/</a:t>
             </a:r>
+            <a:endParaRPr lang="de-DE" dirty="0" smtClean="0"/>
+          </a:p>
+          <a:p>
             <a:endParaRPr lang="de-DE" dirty="0"/>
           </a:p>
         </p:txBody>
@@ -3462,6 +3453,111 @@
           <a:lstStyle/>
           <a:p>
             <a:r>
+              <a:rPr lang="de-DE" dirty="0" err="1" smtClean="0"/>
+              <a:t>Extend</a:t>
+            </a:r>
+            <a:r>
+              <a:rPr lang="de-DE" dirty="0" smtClean="0"/>
+              <a:t> </a:t>
+            </a:r>
+            <a:r>
+              <a:rPr lang="de-DE" dirty="0" err="1" smtClean="0"/>
+              <a:t>of</a:t>
+            </a:r>
+            <a:r>
+              <a:rPr lang="de-DE" dirty="0" smtClean="0"/>
+              <a:t> </a:t>
+            </a:r>
+            <a:r>
+              <a:rPr lang="de-DE" dirty="0" err="1" smtClean="0"/>
+              <a:t>functionality</a:t>
+            </a:r>
+            <a:endParaRPr lang="de-DE" dirty="0"/>
+          </a:p>
+        </p:txBody>
+      </p:sp>
+      <p:pic>
+        <p:nvPicPr>
+          <p:cNvPr id="4" name="Inhaltsplatzhalter 3"/>
+          <p:cNvPicPr>
+            <a:picLocks noGrp="1" noChangeAspect="1"/>
+          </p:cNvPicPr>
+          <p:nvPr>
+            <p:ph idx="1"/>
+          </p:nvPr>
+        </p:nvPicPr>
+        <p:blipFill>
+          <a:blip r:embed="rId2">
+            <a:extLst>
+              <a:ext uri="{28A0092B-C50C-407E-A947-70E740481C1C}">
+                <a14:useLocalDpi xmlns:a14="http://schemas.microsoft.com/office/drawing/2010/main" val="0"/>
+              </a:ext>
+            </a:extLst>
+          </a:blip>
+          <a:stretch>
+            <a:fillRect/>
+          </a:stretch>
+        </p:blipFill>
+        <p:spPr>
+          <a:xfrm>
+            <a:off x="1833550" y="1600200"/>
+            <a:ext cx="5476899" cy="4708525"/>
+          </a:xfrm>
+        </p:spPr>
+      </p:pic>
+    </p:spTree>
+    <p:extLst>
+      <p:ext uri="{BB962C8B-B14F-4D97-AF65-F5344CB8AC3E}">
+        <p14:creationId xmlns:p14="http://schemas.microsoft.com/office/powerpoint/2010/main" val="1201987494"/>
+      </p:ext>
+    </p:extLst>
+  </p:cSld>
+  <p:clrMapOvr>
+    <a:masterClrMapping/>
+  </p:clrMapOvr>
+  <p:timing>
+    <p:tnLst>
+      <p:par>
+        <p:cTn id="1" dur="indefinite" restart="never" nodeType="tmRoot"/>
+      </p:par>
+    </p:tnLst>
+  </p:timing>
+</p:sld>
+</file>
+
+<file path=ppt/slides/slide14.xml><?xml version="1.0" encoding="utf-8"?>
+<p:sld xmlns:a="http://schemas.openxmlformats.org/drawingml/2006/main" xmlns:r="http://schemas.openxmlformats.org/officeDocument/2006/relationships" xmlns:p="http://schemas.openxmlformats.org/presentationml/2006/main">
+  <p:cSld>
+    <p:spTree>
+      <p:nvGrpSpPr>
+        <p:cNvPr id="1" name=""/>
+        <p:cNvGrpSpPr/>
+        <p:nvPr/>
+      </p:nvGrpSpPr>
+      <p:grpSpPr>
+        <a:xfrm>
+          <a:off x="0" y="0"/>
+          <a:ext cx="0" cy="0"/>
+          <a:chOff x="0" y="0"/>
+          <a:chExt cx="0" cy="0"/>
+        </a:xfrm>
+      </p:grpSpPr>
+      <p:sp>
+        <p:nvSpPr>
+          <p:cNvPr id="2" name="Titel 1"/>
+          <p:cNvSpPr>
+            <a:spLocks noGrp="1"/>
+          </p:cNvSpPr>
+          <p:nvPr>
+            <p:ph type="title"/>
+          </p:nvPr>
+        </p:nvSpPr>
+        <p:spPr/>
+        <p:txBody>
+          <a:bodyPr/>
+          <a:lstStyle/>
+          <a:p>
+            <a:r>
               <a:rPr lang="de-DE" dirty="0" smtClean="0"/>
               <a:t>Qualität</a:t>
             </a:r>
@@ -3591,7 +3687,7 @@
 </p:sld>
 </file>
 
-<file path=ppt/slides/slide14.xml><?xml version="1.0" encoding="utf-8"?>
+<file path=ppt/slides/slide15.xml><?xml version="1.0" encoding="utf-8"?>
 <p:sld xmlns:a="http://schemas.openxmlformats.org/drawingml/2006/main" xmlns:r="http://schemas.openxmlformats.org/officeDocument/2006/relationships" xmlns:p="http://schemas.openxmlformats.org/presentationml/2006/main">
   <p:cSld>
     <p:spTree>
@@ -3694,7 +3790,7 @@
 </p:sld>
 </file>
 
-<file path=ppt/slides/slide15.xml><?xml version="1.0" encoding="utf-8"?>
+<file path=ppt/slides/slide16.xml><?xml version="1.0" encoding="utf-8"?>
 <p:sld xmlns:a="http://schemas.openxmlformats.org/drawingml/2006/main" xmlns:r="http://schemas.openxmlformats.org/officeDocument/2006/relationships" xmlns:p="http://schemas.openxmlformats.org/presentationml/2006/main">
   <p:cSld>
     <p:spTree>
@@ -3783,7 +3879,7 @@
 </p:sld>
 </file>
 
-<file path=ppt/slides/slide16.xml><?xml version="1.0" encoding="utf-8"?>
+<file path=ppt/slides/slide17.xml><?xml version="1.0" encoding="utf-8"?>
 <p:sld xmlns:a="http://schemas.openxmlformats.org/drawingml/2006/main" xmlns:r="http://schemas.openxmlformats.org/officeDocument/2006/relationships" xmlns:p="http://schemas.openxmlformats.org/presentationml/2006/main">
   <p:cSld>
     <p:spTree>
@@ -3870,106 +3966,6 @@
 </p:sld>
 </file>
 
-<file path=ppt/slides/slide17.xml><?xml version="1.0" encoding="utf-8"?>
-<p:sld xmlns:a="http://schemas.openxmlformats.org/drawingml/2006/main" xmlns:r="http://schemas.openxmlformats.org/officeDocument/2006/relationships" xmlns:p="http://schemas.openxmlformats.org/presentationml/2006/main">
-  <p:cSld>
-    <p:spTree>
-      <p:nvGrpSpPr>
-        <p:cNvPr id="1" name=""/>
-        <p:cNvGrpSpPr/>
-        <p:nvPr/>
-      </p:nvGrpSpPr>
-      <p:grpSpPr>
-        <a:xfrm>
-          <a:off x="0" y="0"/>
-          <a:ext cx="0" cy="0"/>
-          <a:chOff x="0" y="0"/>
-          <a:chExt cx="0" cy="0"/>
-        </a:xfrm>
-      </p:grpSpPr>
-      <p:sp>
-        <p:nvSpPr>
-          <p:cNvPr id="2" name="Titel 1"/>
-          <p:cNvSpPr>
-            <a:spLocks noGrp="1"/>
-          </p:cNvSpPr>
-          <p:nvPr>
-            <p:ph type="title"/>
-          </p:nvPr>
-        </p:nvSpPr>
-        <p:spPr/>
-        <p:txBody>
-          <a:bodyPr/>
-          <a:lstStyle/>
-          <a:p>
-            <a:r>
-              <a:rPr lang="de-DE" dirty="0" smtClean="0"/>
-              <a:t>Link</a:t>
-            </a:r>
-            <a:endParaRPr lang="de-DE" dirty="0"/>
-          </a:p>
-        </p:txBody>
-      </p:sp>
-      <p:sp>
-        <p:nvSpPr>
-          <p:cNvPr id="3" name="Inhaltsplatzhalter 2"/>
-          <p:cNvSpPr>
-            <a:spLocks noGrp="1"/>
-          </p:cNvSpPr>
-          <p:nvPr>
-            <p:ph idx="1"/>
-          </p:nvPr>
-        </p:nvSpPr>
-        <p:spPr/>
-        <p:txBody>
-          <a:bodyPr/>
-          <a:lstStyle/>
-          <a:p>
-            <a:r>
-              <a:rPr lang="de-DE" dirty="0" smtClean="0"/>
-              <a:t>Blog:</a:t>
-            </a:r>
-          </a:p>
-          <a:p>
-            <a:pPr marL="137160" indent="0">
-              <a:buNone/>
-            </a:pPr>
-            <a:r>
-              <a:rPr lang="de-DE" dirty="0">
-                <a:hlinkClick r:id="rId2"/>
-              </a:rPr>
-              <a:t>https://www.coursesites.com/webapps/portal/frameset.jsp?tab_tab_group_id=null&amp;url=%2Fwebapps%2Fblackboard%2Fexecute%2Flauncher%3Ftype%3DCourse%26id%3D_261651_1%26url%3D</a:t>
-            </a:r>
-            <a:endParaRPr lang="de-DE" dirty="0"/>
-          </a:p>
-          <a:p>
-            <a:pPr marL="137160" indent="0">
-              <a:buNone/>
-            </a:pPr>
-            <a:endParaRPr lang="de-DE" dirty="0"/>
-          </a:p>
-        </p:txBody>
-      </p:sp>
-    </p:spTree>
-    <p:extLst>
-      <p:ext uri="{BB962C8B-B14F-4D97-AF65-F5344CB8AC3E}">
-        <p14:creationId xmlns:p14="http://schemas.microsoft.com/office/powerpoint/2010/main" val="1051875190"/>
-      </p:ext>
-    </p:extLst>
-  </p:cSld>
-  <p:clrMapOvr>
-    <a:masterClrMapping/>
-  </p:clrMapOvr>
-  <p:timing>
-    <p:tnLst>
-      <p:par>
-        <p:cTn id="1" dur="indefinite" restart="never" nodeType="tmRoot"/>
-      </p:par>
-    </p:tnLst>
-  </p:timing>
-</p:sld>
-</file>
-
 <file path=ppt/slides/slide18.xml><?xml version="1.0" encoding="utf-8"?>
 <p:sld xmlns:a="http://schemas.openxmlformats.org/drawingml/2006/main" xmlns:r="http://schemas.openxmlformats.org/officeDocument/2006/relationships" xmlns:p="http://schemas.openxmlformats.org/presentationml/2006/main">
   <p:cSld>
@@ -4002,7 +3998,11 @@
           <a:bodyPr/>
           <a:lstStyle/>
           <a:p>
-            <a:endParaRPr lang="de-DE"/>
+            <a:r>
+              <a:rPr lang="de-DE" dirty="0" smtClean="0"/>
+              <a:t>Link</a:t>
+            </a:r>
+            <a:endParaRPr lang="de-DE" dirty="0"/>
           </a:p>
         </p:txBody>
       </p:sp>
@@ -4021,14 +4021,35 @@
           <a:bodyPr/>
           <a:lstStyle/>
           <a:p>
-            <a:endParaRPr lang="de-DE"/>
+            <a:r>
+              <a:rPr lang="de-DE" dirty="0" smtClean="0"/>
+              <a:t>Blog:</a:t>
+            </a:r>
+          </a:p>
+          <a:p>
+            <a:pPr marL="137160" indent="0">
+              <a:buNone/>
+            </a:pPr>
+            <a:r>
+              <a:rPr lang="de-DE" dirty="0">
+                <a:hlinkClick r:id="rId2"/>
+              </a:rPr>
+              <a:t>https://www.coursesites.com/webapps/portal/frameset.jsp?tab_tab_group_id=null&amp;url=%2Fwebapps%2Fblackboard%2Fexecute%2Flauncher%3Ftype%3DCourse%26id%3D_261651_1%26url%3D</a:t>
+            </a:r>
+            <a:endParaRPr lang="de-DE" dirty="0"/>
+          </a:p>
+          <a:p>
+            <a:pPr marL="137160" indent="0">
+              <a:buNone/>
+            </a:pPr>
+            <a:endParaRPr lang="de-DE" dirty="0"/>
           </a:p>
         </p:txBody>
       </p:sp>
     </p:spTree>
     <p:extLst>
       <p:ext uri="{BB962C8B-B14F-4D97-AF65-F5344CB8AC3E}">
-        <p14:creationId xmlns:p14="http://schemas.microsoft.com/office/powerpoint/2010/main" val="2507173618"/>
+        <p14:creationId xmlns:p14="http://schemas.microsoft.com/office/powerpoint/2010/main" val="1051875190"/>
       </p:ext>
     </p:extLst>
   </p:cSld>

</xml_diff>

<commit_message>
Jira eingefügt, Link angepasst, Github-Link hinzugefügt
</commit_message>
<xml_diff>
--- a/Final Project Handin/Final Presentation/Online-Library.pptx
+++ b/Final Project Handin/Final Presentation/Online-Library.pptx
@@ -15,19 +15,20 @@
     <p:sldId id="261" r:id="rId9"/>
     <p:sldId id="263" r:id="rId10"/>
     <p:sldId id="267" r:id="rId11"/>
-    <p:sldId id="269" r:id="rId12"/>
-    <p:sldId id="270" r:id="rId13"/>
-    <p:sldId id="279" r:id="rId14"/>
-    <p:sldId id="271" r:id="rId15"/>
-    <p:sldId id="272" r:id="rId16"/>
-    <p:sldId id="278" r:id="rId17"/>
-    <p:sldId id="274" r:id="rId18"/>
-    <p:sldId id="273" r:id="rId19"/>
+    <p:sldId id="280" r:id="rId12"/>
+    <p:sldId id="269" r:id="rId13"/>
+    <p:sldId id="270" r:id="rId14"/>
+    <p:sldId id="279" r:id="rId15"/>
+    <p:sldId id="271" r:id="rId16"/>
+    <p:sldId id="272" r:id="rId17"/>
+    <p:sldId id="278" r:id="rId18"/>
+    <p:sldId id="274" r:id="rId19"/>
+    <p:sldId id="273" r:id="rId20"/>
   </p:sldIdLst>
   <p:sldSz cx="9144000" cy="6858000" type="screen4x3"/>
   <p:notesSz cx="6858000" cy="9144000"/>
   <p:custDataLst>
-    <p:tags r:id="rId20"/>
+    <p:tags r:id="rId21"/>
   </p:custDataLst>
   <p:defaultTextStyle>
     <a:defPPr>
@@ -126,7 +127,7 @@
   </p:defaultTextStyle>
   <p:extLst>
     <p:ext uri="{EFAFB233-063F-42B5-8137-9DF3F51BA10A}">
-      <p15:sldGuideLst xmlns:p15="http://schemas.microsoft.com/office/powerpoint/2012/main" xmlns="">
+      <p15:sldGuideLst xmlns:p15="http://schemas.microsoft.com/office/powerpoint/2012/main">
         <p15:guide id="1" orient="horz" pos="2160">
           <p15:clr>
             <a:srgbClr val="A4A3A4"/>
@@ -254,7 +255,7 @@
           <a:p>
             <a:fld id="{C542B042-146A-4BF0-A56A-76E3CE54648B}" type="datetimeFigureOut">
               <a:rPr lang="de-DE" smtClean="0"/>
-              <a:t>16.06.2014</a:t>
+              <a:t>17.06.2014</a:t>
             </a:fld>
             <a:endParaRPr lang="de-DE"/>
           </a:p>
@@ -480,7 +481,7 @@
           <a:p>
             <a:fld id="{C542B042-146A-4BF0-A56A-76E3CE54648B}" type="datetimeFigureOut">
               <a:rPr lang="de-DE" smtClean="0"/>
-              <a:t>16.06.2014</a:t>
+              <a:t>17.06.2014</a:t>
             </a:fld>
             <a:endParaRPr lang="de-DE"/>
           </a:p>
@@ -655,7 +656,7 @@
           <a:p>
             <a:fld id="{C542B042-146A-4BF0-A56A-76E3CE54648B}" type="datetimeFigureOut">
               <a:rPr lang="de-DE" smtClean="0"/>
-              <a:t>16.06.2014</a:t>
+              <a:t>17.06.2014</a:t>
             </a:fld>
             <a:endParaRPr lang="de-DE"/>
           </a:p>
@@ -820,7 +821,7 @@
           <a:p>
             <a:fld id="{C542B042-146A-4BF0-A56A-76E3CE54648B}" type="datetimeFigureOut">
               <a:rPr lang="de-DE" smtClean="0"/>
-              <a:t>16.06.2014</a:t>
+              <a:t>17.06.2014</a:t>
             </a:fld>
             <a:endParaRPr lang="de-DE"/>
           </a:p>
@@ -1064,7 +1065,7 @@
           <a:p>
             <a:fld id="{C542B042-146A-4BF0-A56A-76E3CE54648B}" type="datetimeFigureOut">
               <a:rPr lang="de-DE" smtClean="0"/>
-              <a:t>16.06.2014</a:t>
+              <a:t>17.06.2014</a:t>
             </a:fld>
             <a:endParaRPr lang="de-DE"/>
           </a:p>
@@ -1328,7 +1329,7 @@
           <a:p>
             <a:fld id="{C542B042-146A-4BF0-A56A-76E3CE54648B}" type="datetimeFigureOut">
               <a:rPr lang="de-DE" smtClean="0"/>
-              <a:t>16.06.2014</a:t>
+              <a:t>17.06.2014</a:t>
             </a:fld>
             <a:endParaRPr lang="de-DE"/>
           </a:p>
@@ -1702,7 +1703,7 @@
           <a:p>
             <a:fld id="{C542B042-146A-4BF0-A56A-76E3CE54648B}" type="datetimeFigureOut">
               <a:rPr lang="de-DE" smtClean="0"/>
-              <a:t>16.06.2014</a:t>
+              <a:t>17.06.2014</a:t>
             </a:fld>
             <a:endParaRPr lang="de-DE"/>
           </a:p>
@@ -1815,7 +1816,7 @@
           <a:p>
             <a:fld id="{C542B042-146A-4BF0-A56A-76E3CE54648B}" type="datetimeFigureOut">
               <a:rPr lang="de-DE" smtClean="0"/>
-              <a:t>16.06.2014</a:t>
+              <a:t>17.06.2014</a:t>
             </a:fld>
             <a:endParaRPr lang="de-DE"/>
           </a:p>
@@ -1905,7 +1906,7 @@
           <a:p>
             <a:fld id="{C542B042-146A-4BF0-A56A-76E3CE54648B}" type="datetimeFigureOut">
               <a:rPr lang="de-DE" smtClean="0"/>
-              <a:t>16.06.2014</a:t>
+              <a:t>17.06.2014</a:t>
             </a:fld>
             <a:endParaRPr lang="de-DE"/>
           </a:p>
@@ -2163,7 +2164,7 @@
           <a:p>
             <a:fld id="{C542B042-146A-4BF0-A56A-76E3CE54648B}" type="datetimeFigureOut">
               <a:rPr lang="de-DE" smtClean="0"/>
-              <a:t>16.06.2014</a:t>
+              <a:t>17.06.2014</a:t>
             </a:fld>
             <a:endParaRPr lang="de-DE"/>
           </a:p>
@@ -2427,7 +2428,7 @@
           <a:p>
             <a:fld id="{C542B042-146A-4BF0-A56A-76E3CE54648B}" type="datetimeFigureOut">
               <a:rPr lang="de-DE" smtClean="0"/>
-              <a:t>16.06.2014</a:t>
+              <a:t>17.06.2014</a:t>
             </a:fld>
             <a:endParaRPr lang="de-DE"/>
           </a:p>
@@ -2644,7 +2645,7 @@
           <a:p>
             <a:fld id="{C542B042-146A-4BF0-A56A-76E3CE54648B}" type="datetimeFigureOut">
               <a:rPr lang="de-DE" smtClean="0"/>
-              <a:t>16.06.2014</a:t>
+              <a:t>17.06.2014</a:t>
             </a:fld>
             <a:endParaRPr lang="de-DE"/>
           </a:p>
@@ -3263,6 +3264,85 @@
           <a:p>
             <a:r>
               <a:rPr lang="de-DE" dirty="0" smtClean="0"/>
+              <a:t>JIRA</a:t>
+            </a:r>
+            <a:endParaRPr lang="de-DE" dirty="0"/>
+          </a:p>
+        </p:txBody>
+      </p:sp>
+      <p:pic>
+        <p:nvPicPr>
+          <p:cNvPr id="4" name="Inhaltsplatzhalter 3"/>
+          <p:cNvPicPr>
+            <a:picLocks noGrp="1" noChangeAspect="1"/>
+          </p:cNvPicPr>
+          <p:nvPr>
+            <p:ph idx="1"/>
+          </p:nvPr>
+        </p:nvPicPr>
+        <p:blipFill>
+          <a:blip r:embed="rId2"/>
+          <a:stretch>
+            <a:fillRect/>
+          </a:stretch>
+        </p:blipFill>
+        <p:spPr>
+          <a:xfrm>
+            <a:off x="1639280" y="1844824"/>
+            <a:ext cx="5865440" cy="3724554"/>
+          </a:xfrm>
+          <a:prstGeom prst="rect">
+            <a:avLst/>
+          </a:prstGeom>
+        </p:spPr>
+      </p:pic>
+    </p:spTree>
+    <p:extLst>
+      <p:ext uri="{BB962C8B-B14F-4D97-AF65-F5344CB8AC3E}">
+        <p14:creationId xmlns:p14="http://schemas.microsoft.com/office/powerpoint/2010/main" val="1489771109"/>
+      </p:ext>
+    </p:extLst>
+  </p:cSld>
+  <p:clrMapOvr>
+    <a:masterClrMapping/>
+  </p:clrMapOvr>
+</p:sld>
+</file>
+
+<file path=ppt/slides/slide12.xml><?xml version="1.0" encoding="utf-8"?>
+<p:sld xmlns:a="http://schemas.openxmlformats.org/drawingml/2006/main" xmlns:r="http://schemas.openxmlformats.org/officeDocument/2006/relationships" xmlns:p="http://schemas.openxmlformats.org/presentationml/2006/main">
+  <p:cSld>
+    <p:spTree>
+      <p:nvGrpSpPr>
+        <p:cNvPr id="1" name=""/>
+        <p:cNvGrpSpPr/>
+        <p:nvPr/>
+      </p:nvGrpSpPr>
+      <p:grpSpPr>
+        <a:xfrm>
+          <a:off x="0" y="0"/>
+          <a:ext cx="0" cy="0"/>
+          <a:chOff x="0" y="0"/>
+          <a:chExt cx="0" cy="0"/>
+        </a:xfrm>
+      </p:grpSpPr>
+      <p:sp>
+        <p:nvSpPr>
+          <p:cNvPr id="2" name="Titel 1"/>
+          <p:cNvSpPr>
+            <a:spLocks noGrp="1"/>
+          </p:cNvSpPr>
+          <p:nvPr>
+            <p:ph type="title"/>
+          </p:nvPr>
+        </p:nvSpPr>
+        <p:spPr/>
+        <p:txBody>
+          <a:bodyPr/>
+          <a:lstStyle/>
+          <a:p>
+            <a:r>
+              <a:rPr lang="de-DE" dirty="0" smtClean="0"/>
               <a:t>FP </a:t>
             </a:r>
             <a:r>
@@ -3322,7 +3402,7 @@
 </p:sld>
 </file>
 
-<file path=ppt/slides/slide12.xml><?xml version="1.0" encoding="utf-8"?>
+<file path=ppt/slides/slide13.xml><?xml version="1.0" encoding="utf-8"?>
 <p:sld xmlns:a="http://schemas.openxmlformats.org/drawingml/2006/main" xmlns:r="http://schemas.openxmlformats.org/officeDocument/2006/relationships" xmlns:p="http://schemas.openxmlformats.org/presentationml/2006/main">
   <p:cSld>
     <p:spTree>
@@ -3385,14 +3465,17 @@
               <a:rPr lang="de-DE" dirty="0">
                 <a:hlinkClick r:id="rId2"/>
               </a:rPr>
-              <a:t>http://localhost:50090</a:t>
+              <a:t>http</a:t>
             </a:r>
             <a:r>
               <a:rPr lang="de-DE" dirty="0" smtClean="0">
                 <a:hlinkClick r:id="rId2"/>
               </a:rPr>
-              <a:t>/</a:t>
-            </a:r>
+              <a:t>://torsten-werner.com/ONLIB/ONLIB_dev</a:t>
+            </a:r>
+            <a:endParaRPr lang="de-DE" dirty="0" smtClean="0"/>
+          </a:p>
+          <a:p>
             <a:endParaRPr lang="de-DE" dirty="0" smtClean="0"/>
           </a:p>
           <a:p>
@@ -3420,7 +3503,7 @@
 </p:sld>
 </file>
 
-<file path=ppt/slides/slide13.xml><?xml version="1.0" encoding="utf-8"?>
+<file path=ppt/slides/slide14.xml><?xml version="1.0" encoding="utf-8"?>
 <p:sld xmlns:a="http://schemas.openxmlformats.org/drawingml/2006/main" xmlns:r="http://schemas.openxmlformats.org/officeDocument/2006/relationships" xmlns:p="http://schemas.openxmlformats.org/presentationml/2006/main">
   <p:cSld>
     <p:spTree>
@@ -3525,7 +3608,7 @@
 </p:sld>
 </file>
 
-<file path=ppt/slides/slide14.xml><?xml version="1.0" encoding="utf-8"?>
+<file path=ppt/slides/slide15.xml><?xml version="1.0" encoding="utf-8"?>
 <p:sld xmlns:a="http://schemas.openxmlformats.org/drawingml/2006/main" xmlns:r="http://schemas.openxmlformats.org/officeDocument/2006/relationships" xmlns:p="http://schemas.openxmlformats.org/presentationml/2006/main">
   <p:cSld>
     <p:spTree>
@@ -3592,12 +3675,16 @@
           <a:p>
             <a:pPr lvl="1"/>
             <a:r>
-              <a:rPr lang="de-DE" dirty="0" err="1"/>
-              <a:t>Git</a:t>
+              <a:rPr lang="de-DE" dirty="0" err="1" smtClean="0"/>
+              <a:t>Github</a:t>
+            </a:r>
+            <a:r>
+              <a:rPr lang="de-DE" dirty="0" smtClean="0"/>
+              <a:t> </a:t>
             </a:r>
             <a:r>
               <a:rPr lang="de-DE" dirty="0"/>
-              <a:t> zur Versionsverwaltung des Codes</a:t>
+              <a:t>zur Versionsverwaltung des Codes</a:t>
             </a:r>
           </a:p>
           <a:p>
@@ -3687,7 +3774,7 @@
 </p:sld>
 </file>
 
-<file path=ppt/slides/slide15.xml><?xml version="1.0" encoding="utf-8"?>
+<file path=ppt/slides/slide16.xml><?xml version="1.0" encoding="utf-8"?>
 <p:sld xmlns:a="http://schemas.openxmlformats.org/drawingml/2006/main" xmlns:r="http://schemas.openxmlformats.org/officeDocument/2006/relationships" xmlns:p="http://schemas.openxmlformats.org/presentationml/2006/main">
   <p:cSld>
     <p:spTree>
@@ -3790,7 +3877,7 @@
 </p:sld>
 </file>
 
-<file path=ppt/slides/slide16.xml><?xml version="1.0" encoding="utf-8"?>
+<file path=ppt/slides/slide17.xml><?xml version="1.0" encoding="utf-8"?>
 <p:sld xmlns:a="http://schemas.openxmlformats.org/drawingml/2006/main" xmlns:r="http://schemas.openxmlformats.org/officeDocument/2006/relationships" xmlns:p="http://schemas.openxmlformats.org/presentationml/2006/main">
   <p:cSld>
     <p:spTree>
@@ -3879,7 +3966,7 @@
 </p:sld>
 </file>
 
-<file path=ppt/slides/slide17.xml><?xml version="1.0" encoding="utf-8"?>
+<file path=ppt/slides/slide18.xml><?xml version="1.0" encoding="utf-8"?>
 <p:sld xmlns:a="http://schemas.openxmlformats.org/drawingml/2006/main" xmlns:r="http://schemas.openxmlformats.org/officeDocument/2006/relationships" xmlns:p="http://schemas.openxmlformats.org/presentationml/2006/main">
   <p:cSld>
     <p:spTree>
@@ -3966,7 +4053,7 @@
 </p:sld>
 </file>
 
-<file path=ppt/slides/slide18.xml><?xml version="1.0" encoding="utf-8"?>
+<file path=ppt/slides/slide19.xml><?xml version="1.0" encoding="utf-8"?>
 <p:sld xmlns:a="http://schemas.openxmlformats.org/drawingml/2006/main" xmlns:r="http://schemas.openxmlformats.org/officeDocument/2006/relationships" xmlns:p="http://schemas.openxmlformats.org/presentationml/2006/main">
   <p:cSld>
     <p:spTree>
@@ -4025,24 +4112,55 @@
               <a:rPr lang="de-DE" dirty="0" smtClean="0"/>
               <a:t>Blog:</a:t>
             </a:r>
-          </a:p>
-          <a:p>
-            <a:pPr marL="137160" indent="0">
-              <a:buNone/>
-            </a:pPr>
+            <a:br>
+              <a:rPr lang="de-DE" dirty="0" smtClean="0"/>
+            </a:br>
+            <a:r>
+              <a:rPr lang="de-DE" dirty="0" smtClean="0">
+                <a:hlinkClick r:id="rId2"/>
+              </a:rPr>
+              <a:t>https</a:t>
+            </a:r>
             <a:r>
               <a:rPr lang="de-DE" dirty="0">
                 <a:hlinkClick r:id="rId2"/>
               </a:rPr>
-              <a:t>https://www.coursesites.com/webapps/portal/frameset.jsp?tab_tab_group_id=null&amp;url=%2Fwebapps%2Fblackboard%2Fexecute%2Flauncher%3Ftype%3DCourse%26id%3D_261651_1%26url%3D</a:t>
+              <a:t>://www.coursesites.com/webapps/portal/frameset.jsp?tab_tab_group_id=null&amp;url=%</a:t>
+            </a:r>
+            <a:r>
+              <a:rPr lang="de-DE" dirty="0" smtClean="0">
+                <a:hlinkClick r:id="rId2"/>
+              </a:rPr>
+              <a:t>2Fwebapps%2Fblackboard%2Fexecute%2Flauncher%3Ftype%3DCourse%26id%3D_261651_1%26url%3D</a:t>
             </a:r>
             <a:endParaRPr lang="de-DE" dirty="0"/>
           </a:p>
           <a:p>
-            <a:pPr marL="137160" indent="0">
-              <a:buNone/>
-            </a:pPr>
-            <a:endParaRPr lang="de-DE" dirty="0"/>
+            <a:r>
+              <a:rPr lang="de-DE" dirty="0" err="1" smtClean="0"/>
+              <a:t>Github</a:t>
+            </a:r>
+            <a:r>
+              <a:rPr lang="de-DE" dirty="0" smtClean="0"/>
+              <a:t>:</a:t>
+            </a:r>
+            <a:r>
+              <a:rPr lang="de-DE" dirty="0"/>
+              <a:t/>
+            </a:r>
+            <a:br>
+              <a:rPr lang="de-DE" dirty="0"/>
+            </a:br>
+            <a:r>
+              <a:rPr lang="de-DE" dirty="0" smtClean="0">
+                <a:hlinkClick r:id="rId3"/>
+              </a:rPr>
+              <a:t>https://www.github.com/twerner93/ONLIB</a:t>
+            </a:r>
+            <a:endParaRPr lang="de-DE" dirty="0" smtClean="0"/>
+          </a:p>
+          <a:p>
+            <a:endParaRPr lang="de-DE" dirty="0" smtClean="0"/>
           </a:p>
         </p:txBody>
       </p:sp>

</xml_diff>

<commit_message>
Demo nach ganz hinten
</commit_message>
<xml_diff>
--- a/Final Project Handin/Final Presentation/Online-Library.pptx
+++ b/Final Project Handin/Final Presentation/Online-Library.pptx
@@ -17,14 +17,14 @@
     <p:sldId id="267" r:id="rId11"/>
     <p:sldId id="280" r:id="rId12"/>
     <p:sldId id="269" r:id="rId13"/>
-    <p:sldId id="270" r:id="rId14"/>
-    <p:sldId id="279" r:id="rId15"/>
-    <p:sldId id="271" r:id="rId16"/>
-    <p:sldId id="282" r:id="rId17"/>
-    <p:sldId id="281" r:id="rId18"/>
-    <p:sldId id="272" r:id="rId19"/>
-    <p:sldId id="278" r:id="rId20"/>
-    <p:sldId id="274" r:id="rId21"/>
+    <p:sldId id="279" r:id="rId14"/>
+    <p:sldId id="271" r:id="rId15"/>
+    <p:sldId id="282" r:id="rId16"/>
+    <p:sldId id="281" r:id="rId17"/>
+    <p:sldId id="272" r:id="rId18"/>
+    <p:sldId id="278" r:id="rId19"/>
+    <p:sldId id="274" r:id="rId20"/>
+    <p:sldId id="270" r:id="rId21"/>
     <p:sldId id="273" r:id="rId22"/>
   </p:sldIdLst>
   <p:sldSz cx="9144000" cy="6858000" type="screen4x3"/>
@@ -129,7 +129,7 @@
   </p:defaultTextStyle>
   <p:extLst>
     <p:ext uri="{EFAFB233-063F-42B5-8137-9DF3F51BA10A}">
-      <p15:sldGuideLst xmlns:p15="http://schemas.microsoft.com/office/powerpoint/2012/main">
+      <p15:sldGuideLst xmlns:p15="http://schemas.microsoft.com/office/powerpoint/2012/main" xmlns="">
         <p15:guide id="1" orient="horz" pos="2160">
           <p15:clr>
             <a:srgbClr val="A4A3A4"/>
@@ -3437,107 +3437,6 @@
           <a:lstStyle/>
           <a:p>
             <a:r>
-              <a:rPr lang="de-DE" dirty="0" smtClean="0"/>
-              <a:t>Demo</a:t>
-            </a:r>
-            <a:endParaRPr lang="de-DE" dirty="0"/>
-          </a:p>
-        </p:txBody>
-      </p:sp>
-      <p:sp>
-        <p:nvSpPr>
-          <p:cNvPr id="3" name="Inhaltsplatzhalter 2"/>
-          <p:cNvSpPr>
-            <a:spLocks noGrp="1"/>
-          </p:cNvSpPr>
-          <p:nvPr>
-            <p:ph idx="1"/>
-          </p:nvPr>
-        </p:nvSpPr>
-        <p:spPr/>
-        <p:txBody>
-          <a:bodyPr/>
-          <a:lstStyle/>
-          <a:p>
-            <a:r>
-              <a:rPr lang="de-DE" dirty="0" smtClean="0"/>
-              <a:t>Link: </a:t>
-            </a:r>
-            <a:r>
-              <a:rPr lang="de-DE" dirty="0">
-                <a:hlinkClick r:id="rId2"/>
-              </a:rPr>
-              <a:t>http</a:t>
-            </a:r>
-            <a:r>
-              <a:rPr lang="de-DE" dirty="0" smtClean="0">
-                <a:hlinkClick r:id="rId2"/>
-              </a:rPr>
-              <a:t>://torsten-werner.com/ONLIB/ONLIB_dev</a:t>
-            </a:r>
-            <a:endParaRPr lang="de-DE" dirty="0" smtClean="0"/>
-          </a:p>
-          <a:p>
-            <a:endParaRPr lang="de-DE" dirty="0" smtClean="0"/>
-          </a:p>
-          <a:p>
-            <a:endParaRPr lang="de-DE" dirty="0"/>
-          </a:p>
-        </p:txBody>
-      </p:sp>
-    </p:spTree>
-    <p:extLst>
-      <p:ext uri="{BB962C8B-B14F-4D97-AF65-F5344CB8AC3E}">
-        <p14:creationId xmlns:p14="http://schemas.microsoft.com/office/powerpoint/2010/main" val="1328486154"/>
-      </p:ext>
-    </p:extLst>
-  </p:cSld>
-  <p:clrMapOvr>
-    <a:masterClrMapping/>
-  </p:clrMapOvr>
-  <p:timing>
-    <p:tnLst>
-      <p:par>
-        <p:cTn id="1" dur="indefinite" restart="never" nodeType="tmRoot"/>
-      </p:par>
-    </p:tnLst>
-  </p:timing>
-</p:sld>
-</file>
-
-<file path=ppt/slides/slide14.xml><?xml version="1.0" encoding="utf-8"?>
-<p:sld xmlns:a="http://schemas.openxmlformats.org/drawingml/2006/main" xmlns:r="http://schemas.openxmlformats.org/officeDocument/2006/relationships" xmlns:p="http://schemas.openxmlformats.org/presentationml/2006/main">
-  <p:cSld>
-    <p:spTree>
-      <p:nvGrpSpPr>
-        <p:cNvPr id="1" name=""/>
-        <p:cNvGrpSpPr/>
-        <p:nvPr/>
-      </p:nvGrpSpPr>
-      <p:grpSpPr>
-        <a:xfrm>
-          <a:off x="0" y="0"/>
-          <a:ext cx="0" cy="0"/>
-          <a:chOff x="0" y="0"/>
-          <a:chExt cx="0" cy="0"/>
-        </a:xfrm>
-      </p:grpSpPr>
-      <p:sp>
-        <p:nvSpPr>
-          <p:cNvPr id="2" name="Titel 1"/>
-          <p:cNvSpPr>
-            <a:spLocks noGrp="1"/>
-          </p:cNvSpPr>
-          <p:nvPr>
-            <p:ph type="title"/>
-          </p:nvPr>
-        </p:nvSpPr>
-        <p:spPr/>
-        <p:txBody>
-          <a:bodyPr/>
-          <a:lstStyle/>
-          <a:p>
-            <a:r>
               <a:rPr lang="de-DE" dirty="0" err="1" smtClean="0"/>
               <a:t>Extend</a:t>
             </a:r>
@@ -3610,6 +3509,147 @@
 </p:sld>
 </file>
 
+<file path=ppt/slides/slide14.xml><?xml version="1.0" encoding="utf-8"?>
+<p:sld xmlns:a="http://schemas.openxmlformats.org/drawingml/2006/main" xmlns:r="http://schemas.openxmlformats.org/officeDocument/2006/relationships" xmlns:p="http://schemas.openxmlformats.org/presentationml/2006/main">
+  <p:cSld>
+    <p:spTree>
+      <p:nvGrpSpPr>
+        <p:cNvPr id="1" name=""/>
+        <p:cNvGrpSpPr/>
+        <p:nvPr/>
+      </p:nvGrpSpPr>
+      <p:grpSpPr>
+        <a:xfrm>
+          <a:off x="0" y="0"/>
+          <a:ext cx="0" cy="0"/>
+          <a:chOff x="0" y="0"/>
+          <a:chExt cx="0" cy="0"/>
+        </a:xfrm>
+      </p:grpSpPr>
+      <p:sp>
+        <p:nvSpPr>
+          <p:cNvPr id="2" name="Titel 1"/>
+          <p:cNvSpPr>
+            <a:spLocks noGrp="1"/>
+          </p:cNvSpPr>
+          <p:nvPr>
+            <p:ph type="title"/>
+          </p:nvPr>
+        </p:nvSpPr>
+        <p:spPr/>
+        <p:txBody>
+          <a:bodyPr/>
+          <a:lstStyle/>
+          <a:p>
+            <a:r>
+              <a:rPr lang="de-DE" dirty="0" smtClean="0"/>
+              <a:t>Qualität</a:t>
+            </a:r>
+            <a:endParaRPr lang="de-DE" dirty="0"/>
+          </a:p>
+        </p:txBody>
+      </p:sp>
+      <p:sp>
+        <p:nvSpPr>
+          <p:cNvPr id="3" name="Inhaltsplatzhalter 2"/>
+          <p:cNvSpPr>
+            <a:spLocks noGrp="1"/>
+          </p:cNvSpPr>
+          <p:nvPr>
+            <p:ph idx="1"/>
+          </p:nvPr>
+        </p:nvSpPr>
+        <p:spPr/>
+        <p:txBody>
+          <a:bodyPr/>
+          <a:lstStyle/>
+          <a:p>
+            <a:r>
+              <a:rPr lang="de-DE" dirty="0" err="1"/>
+              <a:t>Configuration</a:t>
+            </a:r>
+            <a:r>
+              <a:rPr lang="de-DE" dirty="0"/>
+              <a:t> Management</a:t>
+            </a:r>
+          </a:p>
+          <a:p>
+            <a:pPr lvl="1"/>
+            <a:r>
+              <a:rPr lang="de-DE" dirty="0" err="1" smtClean="0"/>
+              <a:t>Github</a:t>
+            </a:r>
+            <a:r>
+              <a:rPr lang="de-DE" dirty="0" smtClean="0"/>
+              <a:t> </a:t>
+            </a:r>
+            <a:r>
+              <a:rPr lang="de-DE" dirty="0"/>
+              <a:t>zur Versionsverwaltung des Codes</a:t>
+            </a:r>
+          </a:p>
+          <a:p>
+            <a:pPr lvl="1"/>
+            <a:r>
+              <a:rPr lang="de-DE" dirty="0"/>
+              <a:t>SVN zur Verwaltung von Dokumenten</a:t>
+            </a:r>
+          </a:p>
+          <a:p>
+            <a:pPr lvl="1"/>
+            <a:r>
+              <a:rPr lang="de-DE" dirty="0"/>
+              <a:t>Visual Studio</a:t>
+            </a:r>
+          </a:p>
+          <a:p>
+            <a:pPr lvl="1"/>
+            <a:r>
+              <a:rPr lang="de-DE" dirty="0"/>
+              <a:t>Microsoft Web </a:t>
+            </a:r>
+            <a:r>
+              <a:rPr lang="de-DE" dirty="0" err="1"/>
+              <a:t>Deploy</a:t>
+            </a:r>
+            <a:endParaRPr lang="de-DE" dirty="0"/>
+          </a:p>
+          <a:p>
+            <a:pPr lvl="1"/>
+            <a:r>
+              <a:rPr lang="de-DE" dirty="0" smtClean="0"/>
+              <a:t>DB-Server</a:t>
+            </a:r>
+            <a:r>
+              <a:rPr lang="de-DE" dirty="0"/>
+              <a:t>: MS-SQL</a:t>
+            </a:r>
+          </a:p>
+          <a:p>
+            <a:endParaRPr lang="de-DE" dirty="0"/>
+          </a:p>
+        </p:txBody>
+      </p:sp>
+    </p:spTree>
+    <p:extLst>
+      <p:ext uri="{BB962C8B-B14F-4D97-AF65-F5344CB8AC3E}">
+        <p14:creationId xmlns:p14="http://schemas.microsoft.com/office/powerpoint/2010/main" val="4032297297"/>
+      </p:ext>
+    </p:extLst>
+  </p:cSld>
+  <p:clrMapOvr>
+    <a:masterClrMapping/>
+  </p:clrMapOvr>
+  <p:timing>
+    <p:tnLst>
+      <p:par>
+        <p:cTn id="1" dur="indefinite" restart="never" nodeType="tmRoot"/>
+      </p:par>
+    </p:tnLst>
+  </p:timing>
+</p:sld>
+</file>
+
 <file path=ppt/slides/slide15.xml><?xml version="1.0" encoding="utf-8"?>
 <p:sld xmlns:a="http://schemas.openxmlformats.org/drawingml/2006/main" xmlns:r="http://schemas.openxmlformats.org/officeDocument/2006/relationships" xmlns:p="http://schemas.openxmlformats.org/presentationml/2006/main">
   <p:cSld>
@@ -3639,7 +3679,9 @@
         </p:nvSpPr>
         <p:spPr/>
         <p:txBody>
-          <a:bodyPr/>
+          <a:bodyPr>
+            <a:normAutofit/>
+          </a:bodyPr>
           <a:lstStyle/>
           <a:p>
             <a:r>
@@ -3665,68 +3707,59 @@
           <a:bodyPr/>
           <a:lstStyle/>
           <a:p>
+            <a:pPr lvl="1"/>
+            <a:r>
+              <a:rPr lang="de-DE" dirty="0"/>
+              <a:t>ASP.NET MVC</a:t>
+            </a:r>
+          </a:p>
+          <a:p>
+            <a:pPr lvl="2"/>
+            <a:r>
+              <a:rPr lang="de-DE" dirty="0"/>
+              <a:t>Codegenerator</a:t>
+            </a:r>
+          </a:p>
+          <a:p>
+            <a:pPr lvl="2"/>
             <a:r>
               <a:rPr lang="de-DE" dirty="0" err="1"/>
-              <a:t>Configuration</a:t>
-            </a:r>
+              <a:t>Scaffolding</a:t>
+            </a:r>
+            <a:endParaRPr lang="de-DE" dirty="0"/>
+          </a:p>
+          <a:p>
+            <a:pPr lvl="2"/>
             <a:r>
               <a:rPr lang="de-DE" dirty="0"/>
-              <a:t> Management</a:t>
+              <a:t>MVC </a:t>
+            </a:r>
+            <a:r>
+              <a:rPr lang="de-DE" dirty="0" smtClean="0"/>
+              <a:t>Konzept</a:t>
             </a:r>
           </a:p>
           <a:p>
             <a:pPr lvl="1"/>
             <a:r>
+              <a:rPr lang="de-DE" dirty="0" smtClean="0"/>
+              <a:t>ADO.NET </a:t>
+            </a:r>
+            <a:r>
               <a:rPr lang="de-DE" dirty="0" err="1" smtClean="0"/>
-              <a:t>Github</a:t>
+              <a:t>Entity</a:t>
             </a:r>
             <a:r>
               <a:rPr lang="de-DE" dirty="0" smtClean="0"/>
-              <a:t> </a:t>
-            </a:r>
-            <a:r>
-              <a:rPr lang="de-DE" dirty="0"/>
-              <a:t>zur Versionsverwaltung des Codes</a:t>
-            </a:r>
-          </a:p>
-          <a:p>
-            <a:pPr lvl="1"/>
-            <a:r>
-              <a:rPr lang="de-DE" dirty="0"/>
-              <a:t>SVN zur Verwaltung von Dokumenten</a:t>
-            </a:r>
-          </a:p>
-          <a:p>
-            <a:pPr lvl="1"/>
-            <a:r>
-              <a:rPr lang="de-DE" dirty="0"/>
-              <a:t>Visual Studio</a:t>
-            </a:r>
-          </a:p>
-          <a:p>
-            <a:pPr lvl="1"/>
-            <a:r>
-              <a:rPr lang="de-DE" dirty="0"/>
-              <a:t>Microsoft Web </a:t>
-            </a:r>
-            <a:r>
-              <a:rPr lang="de-DE" dirty="0" err="1"/>
-              <a:t>Deploy</a:t>
-            </a:r>
-            <a:endParaRPr lang="de-DE" dirty="0"/>
-          </a:p>
-          <a:p>
-            <a:pPr lvl="1"/>
+              <a:t> Framework</a:t>
+            </a:r>
+          </a:p>
+          <a:p>
+            <a:pPr lvl="2"/>
             <a:r>
               <a:rPr lang="de-DE" dirty="0" smtClean="0"/>
-              <a:t>DB-Server</a:t>
-            </a:r>
-            <a:r>
-              <a:rPr lang="de-DE" dirty="0"/>
-              <a:t>: MS-SQL</a:t>
-            </a:r>
-          </a:p>
-          <a:p>
+              <a:t>Unterstützung bei Arbeit mit DB</a:t>
+            </a:r>
             <a:endParaRPr lang="de-DE" dirty="0"/>
           </a:p>
         </p:txBody>
@@ -3734,7 +3767,7 @@
     </p:spTree>
     <p:extLst>
       <p:ext uri="{BB962C8B-B14F-4D97-AF65-F5344CB8AC3E}">
-        <p14:creationId xmlns:p14="http://schemas.microsoft.com/office/powerpoint/2010/main" val="4032297297"/>
+        <p14:creationId xmlns:p14="http://schemas.microsoft.com/office/powerpoint/2010/main" val="1615191520"/>
       </p:ext>
     </p:extLst>
   </p:cSld>
@@ -3780,133 +3813,6 @@
         </p:nvSpPr>
         <p:spPr/>
         <p:txBody>
-          <a:bodyPr>
-            <a:normAutofit/>
-          </a:bodyPr>
-          <a:lstStyle/>
-          <a:p>
-            <a:r>
-              <a:rPr lang="de-DE" dirty="0" smtClean="0"/>
-              <a:t>Qualität</a:t>
-            </a:r>
-            <a:endParaRPr lang="de-DE" dirty="0"/>
-          </a:p>
-        </p:txBody>
-      </p:sp>
-      <p:sp>
-        <p:nvSpPr>
-          <p:cNvPr id="3" name="Inhaltsplatzhalter 2"/>
-          <p:cNvSpPr>
-            <a:spLocks noGrp="1"/>
-          </p:cNvSpPr>
-          <p:nvPr>
-            <p:ph idx="1"/>
-          </p:nvPr>
-        </p:nvSpPr>
-        <p:spPr/>
-        <p:txBody>
-          <a:bodyPr/>
-          <a:lstStyle/>
-          <a:p>
-            <a:pPr lvl="1"/>
-            <a:r>
-              <a:rPr lang="de-DE" dirty="0"/>
-              <a:t>ASP.NET MVC</a:t>
-            </a:r>
-          </a:p>
-          <a:p>
-            <a:pPr lvl="2"/>
-            <a:r>
-              <a:rPr lang="de-DE" dirty="0"/>
-              <a:t>Codegenerator</a:t>
-            </a:r>
-          </a:p>
-          <a:p>
-            <a:pPr lvl="2"/>
-            <a:r>
-              <a:rPr lang="de-DE" dirty="0" err="1"/>
-              <a:t>Scaffolding</a:t>
-            </a:r>
-            <a:endParaRPr lang="de-DE" dirty="0"/>
-          </a:p>
-          <a:p>
-            <a:pPr lvl="2"/>
-            <a:r>
-              <a:rPr lang="de-DE" dirty="0"/>
-              <a:t>MVC </a:t>
-            </a:r>
-            <a:r>
-              <a:rPr lang="de-DE" dirty="0" smtClean="0"/>
-              <a:t>Konzept</a:t>
-            </a:r>
-          </a:p>
-          <a:p>
-            <a:pPr lvl="1"/>
-            <a:r>
-              <a:rPr lang="de-DE" dirty="0" smtClean="0"/>
-              <a:t>ADO.NET </a:t>
-            </a:r>
-            <a:r>
-              <a:rPr lang="de-DE" dirty="0" err="1" smtClean="0"/>
-              <a:t>Entity</a:t>
-            </a:r>
-            <a:r>
-              <a:rPr lang="de-DE" dirty="0" smtClean="0"/>
-              <a:t> Framework</a:t>
-            </a:r>
-          </a:p>
-          <a:p>
-            <a:pPr lvl="2"/>
-            <a:r>
-              <a:rPr lang="de-DE" dirty="0" smtClean="0"/>
-              <a:t>Unterstützung bei Arbeit mit DB</a:t>
-            </a:r>
-            <a:endParaRPr lang="de-DE" dirty="0"/>
-          </a:p>
-        </p:txBody>
-      </p:sp>
-    </p:spTree>
-    <p:extLst>
-      <p:ext uri="{BB962C8B-B14F-4D97-AF65-F5344CB8AC3E}">
-        <p14:creationId xmlns:p14="http://schemas.microsoft.com/office/powerpoint/2010/main" val="1615191520"/>
-      </p:ext>
-    </p:extLst>
-  </p:cSld>
-  <p:clrMapOvr>
-    <a:masterClrMapping/>
-  </p:clrMapOvr>
-</p:sld>
-</file>
-
-<file path=ppt/slides/slide17.xml><?xml version="1.0" encoding="utf-8"?>
-<p:sld xmlns:a="http://schemas.openxmlformats.org/drawingml/2006/main" xmlns:r="http://schemas.openxmlformats.org/officeDocument/2006/relationships" xmlns:p="http://schemas.openxmlformats.org/presentationml/2006/main">
-  <p:cSld>
-    <p:spTree>
-      <p:nvGrpSpPr>
-        <p:cNvPr id="1" name=""/>
-        <p:cNvGrpSpPr/>
-        <p:nvPr/>
-      </p:nvGrpSpPr>
-      <p:grpSpPr>
-        <a:xfrm>
-          <a:off x="0" y="0"/>
-          <a:ext cx="0" cy="0"/>
-          <a:chOff x="0" y="0"/>
-          <a:chExt cx="0" cy="0"/>
-        </a:xfrm>
-      </p:grpSpPr>
-      <p:sp>
-        <p:nvSpPr>
-          <p:cNvPr id="2" name="Titel 1"/>
-          <p:cNvSpPr>
-            <a:spLocks noGrp="1"/>
-          </p:cNvSpPr>
-          <p:nvPr>
-            <p:ph type="title"/>
-          </p:nvPr>
-        </p:nvSpPr>
-        <p:spPr/>
-        <p:txBody>
           <a:bodyPr/>
           <a:lstStyle/>
           <a:p>
@@ -3957,7 +3863,7 @@
 </p:sld>
 </file>
 
-<file path=ppt/slides/slide18.xml><?xml version="1.0" encoding="utf-8"?>
+<file path=ppt/slides/slide17.xml><?xml version="1.0" encoding="utf-8"?>
 <p:sld xmlns:a="http://schemas.openxmlformats.org/drawingml/2006/main" xmlns:r="http://schemas.openxmlformats.org/officeDocument/2006/relationships" xmlns:p="http://schemas.openxmlformats.org/presentationml/2006/main">
   <p:cSld>
     <p:spTree>
@@ -4060,7 +3966,7 @@
 </p:sld>
 </file>
 
-<file path=ppt/slides/slide19.xml><?xml version="1.0" encoding="utf-8"?>
+<file path=ppt/slides/slide18.xml><?xml version="1.0" encoding="utf-8"?>
 <p:sld xmlns:a="http://schemas.openxmlformats.org/drawingml/2006/main" xmlns:r="http://schemas.openxmlformats.org/officeDocument/2006/relationships" xmlns:p="http://schemas.openxmlformats.org/presentationml/2006/main">
   <p:cSld>
     <p:spTree>
@@ -4149,6 +4055,93 @@
 </p:sld>
 </file>
 
+<file path=ppt/slides/slide19.xml><?xml version="1.0" encoding="utf-8"?>
+<p:sld xmlns:a="http://schemas.openxmlformats.org/drawingml/2006/main" xmlns:r="http://schemas.openxmlformats.org/officeDocument/2006/relationships" xmlns:p="http://schemas.openxmlformats.org/presentationml/2006/main">
+  <p:cSld>
+    <p:spTree>
+      <p:nvGrpSpPr>
+        <p:cNvPr id="1" name=""/>
+        <p:cNvGrpSpPr/>
+        <p:nvPr/>
+      </p:nvGrpSpPr>
+      <p:grpSpPr>
+        <a:xfrm>
+          <a:off x="0" y="0"/>
+          <a:ext cx="0" cy="0"/>
+          <a:chOff x="0" y="0"/>
+          <a:chExt cx="0" cy="0"/>
+        </a:xfrm>
+      </p:grpSpPr>
+      <p:sp>
+        <p:nvSpPr>
+          <p:cNvPr id="2" name="Titel 1"/>
+          <p:cNvSpPr>
+            <a:spLocks noGrp="1"/>
+          </p:cNvSpPr>
+          <p:nvPr>
+            <p:ph type="title"/>
+          </p:nvPr>
+        </p:nvSpPr>
+        <p:spPr/>
+        <p:txBody>
+          <a:bodyPr/>
+          <a:lstStyle/>
+          <a:p>
+            <a:r>
+              <a:rPr lang="de-DE" dirty="0" err="1" smtClean="0"/>
+              <a:t>Deployment</a:t>
+            </a:r>
+            <a:r>
+              <a:rPr lang="de-DE" dirty="0" smtClean="0"/>
+              <a:t> View</a:t>
+            </a:r>
+            <a:endParaRPr lang="de-DE" dirty="0"/>
+          </a:p>
+        </p:txBody>
+      </p:sp>
+      <p:pic>
+        <p:nvPicPr>
+          <p:cNvPr id="4" name="Inhaltsplatzhalter 3" descr="DeploymentView.png"/>
+          <p:cNvPicPr>
+            <a:picLocks noGrp="1" noChangeAspect="1"/>
+          </p:cNvPicPr>
+          <p:nvPr>
+            <p:ph idx="1"/>
+          </p:nvPr>
+        </p:nvPicPr>
+        <p:blipFill>
+          <a:blip r:embed="rId2" cstate="print"/>
+          <a:stretch>
+            <a:fillRect/>
+          </a:stretch>
+        </p:blipFill>
+        <p:spPr>
+          <a:xfrm>
+            <a:off x="2052939" y="1600200"/>
+            <a:ext cx="5038122" cy="4708525"/>
+          </a:xfrm>
+        </p:spPr>
+      </p:pic>
+    </p:spTree>
+    <p:extLst>
+      <p:ext uri="{BB962C8B-B14F-4D97-AF65-F5344CB8AC3E}">
+        <p14:creationId xmlns:p14="http://schemas.microsoft.com/office/powerpoint/2010/main" val="836769455"/>
+      </p:ext>
+    </p:extLst>
+  </p:cSld>
+  <p:clrMapOvr>
+    <a:masterClrMapping/>
+  </p:clrMapOvr>
+  <p:timing>
+    <p:tnLst>
+      <p:par>
+        <p:cTn id="1" dur="indefinite" restart="never" nodeType="tmRoot"/>
+      </p:par>
+    </p:tnLst>
+  </p:timing>
+</p:sld>
+</file>
+
 <file path=ppt/slides/slide2.xml><?xml version="1.0" encoding="utf-8"?>
 <p:sld xmlns:a="http://schemas.openxmlformats.org/drawingml/2006/main" xmlns:r="http://schemas.openxmlformats.org/officeDocument/2006/relationships" xmlns:p="http://schemas.openxmlformats.org/presentationml/2006/main">
   <p:cSld>
@@ -4319,44 +4312,58 @@
           <a:lstStyle/>
           <a:p>
             <a:r>
-              <a:rPr lang="de-DE" dirty="0" err="1" smtClean="0"/>
-              <a:t>Deployment</a:t>
-            </a:r>
-            <a:r>
               <a:rPr lang="de-DE" dirty="0" smtClean="0"/>
-              <a:t> View</a:t>
+              <a:t>Demo</a:t>
             </a:r>
             <a:endParaRPr lang="de-DE" dirty="0"/>
           </a:p>
         </p:txBody>
       </p:sp>
-      <p:pic>
-        <p:nvPicPr>
-          <p:cNvPr id="4" name="Inhaltsplatzhalter 3" descr="DeploymentView.png"/>
-          <p:cNvPicPr>
-            <a:picLocks noGrp="1" noChangeAspect="1"/>
-          </p:cNvPicPr>
+      <p:sp>
+        <p:nvSpPr>
+          <p:cNvPr id="3" name="Inhaltsplatzhalter 2"/>
+          <p:cNvSpPr>
+            <a:spLocks noGrp="1"/>
+          </p:cNvSpPr>
           <p:nvPr>
             <p:ph idx="1"/>
           </p:nvPr>
-        </p:nvPicPr>
-        <p:blipFill>
-          <a:blip r:embed="rId2" cstate="print"/>
-          <a:stretch>
-            <a:fillRect/>
-          </a:stretch>
-        </p:blipFill>
-        <p:spPr>
-          <a:xfrm>
-            <a:off x="2052939" y="1600200"/>
-            <a:ext cx="5038122" cy="4708525"/>
-          </a:xfrm>
-        </p:spPr>
-      </p:pic>
+        </p:nvSpPr>
+        <p:spPr/>
+        <p:txBody>
+          <a:bodyPr/>
+          <a:lstStyle/>
+          <a:p>
+            <a:r>
+              <a:rPr lang="de-DE" dirty="0" smtClean="0"/>
+              <a:t>Link: </a:t>
+            </a:r>
+            <a:r>
+              <a:rPr lang="de-DE" dirty="0">
+                <a:hlinkClick r:id="rId2"/>
+              </a:rPr>
+              <a:t>http</a:t>
+            </a:r>
+            <a:r>
+              <a:rPr lang="de-DE" dirty="0" smtClean="0">
+                <a:hlinkClick r:id="rId2"/>
+              </a:rPr>
+              <a:t>://torsten-werner.com/ONLIB/ONLIB_dev</a:t>
+            </a:r>
+            <a:endParaRPr lang="de-DE" dirty="0" smtClean="0"/>
+          </a:p>
+          <a:p>
+            <a:endParaRPr lang="de-DE" dirty="0" smtClean="0"/>
+          </a:p>
+          <a:p>
+            <a:endParaRPr lang="de-DE" dirty="0"/>
+          </a:p>
+        </p:txBody>
+      </p:sp>
     </p:spTree>
     <p:extLst>
       <p:ext uri="{BB962C8B-B14F-4D97-AF65-F5344CB8AC3E}">
-        <p14:creationId xmlns:p14="http://schemas.microsoft.com/office/powerpoint/2010/main" val="836769455"/>
+        <p14:creationId xmlns:p14="http://schemas.microsoft.com/office/powerpoint/2010/main" val="1328486154"/>
       </p:ext>
     </p:extLst>
   </p:cSld>

</xml_diff>